<commit_message>
Documentação atualizada em PDF
</commit_message>
<xml_diff>
--- a/Documentação/Engenharia de Sofware - Arq Componentes.pptx
+++ b/Documentação/Engenharia de Sofware - Arq Componentes.pptx
@@ -227,7 +227,7 @@
             <a:fld id="{C3CD65D1-5C11-455D-9F9A-0E035F00A0DA}" type="datetimeFigureOut">
               <a:rPr lang="pt-BR" smtClean="0"/>
               <a:pPr/>
-              <a:t>17/11/2021</a:t>
+              <a:t>24/11/2021</a:t>
             </a:fld>
             <a:endParaRPr lang="pt-BR"/>
           </a:p>
@@ -395,7 +395,7 @@
             <a:fld id="{A05DA3EF-18EA-43DE-B1BB-402A3C558822}" type="datetimeFigureOut">
               <a:rPr lang="pt-BR" smtClean="0"/>
               <a:pPr/>
-              <a:t>17/11/2021</a:t>
+              <a:t>24/11/2021</a:t>
             </a:fld>
             <a:endParaRPr lang="pt-BR"/>
           </a:p>
@@ -29642,8 +29642,8 @@
         </p:nvSpPr>
         <p:spPr>
           <a:xfrm>
-            <a:off x="137010" y="2931406"/>
-            <a:ext cx="2350434" cy="2016224"/>
+            <a:off x="95802" y="1338248"/>
+            <a:ext cx="2203724" cy="1980228"/>
           </a:xfrm>
           <a:prstGeom prst="flowChartMagneticDisk">
             <a:avLst/>
@@ -29691,98 +29691,6 @@
       </p:sp>
       <p:sp>
         <p:nvSpPr>
-          <p:cNvPr id="109" name="Retângulo 29">
-            <a:extLst>
-              <a:ext uri="{FF2B5EF4-FFF2-40B4-BE49-F238E27FC236}">
-                <a16:creationId xmlns:a16="http://schemas.microsoft.com/office/drawing/2014/main" id="{40D7BF1A-655B-324F-B3D4-B1A904D3B5CE}"/>
-              </a:ext>
-            </a:extLst>
-          </p:cNvPr>
-          <p:cNvSpPr/>
-          <p:nvPr/>
-        </p:nvSpPr>
-        <p:spPr>
-          <a:xfrm>
-            <a:off x="2692892" y="776177"/>
-            <a:ext cx="9087389" cy="6420113"/>
-          </a:xfrm>
-          <a:prstGeom prst="rect">
-            <a:avLst/>
-          </a:prstGeom>
-          <a:noFill/>
-          <a:ln>
-            <a:solidFill>
-              <a:srgbClr val="253746"/>
-            </a:solidFill>
-            <a:prstDash val="dash"/>
-          </a:ln>
-        </p:spPr>
-        <p:style>
-          <a:lnRef idx="2">
-            <a:schemeClr val="accent1">
-              <a:shade val="50000"/>
-            </a:schemeClr>
-          </a:lnRef>
-          <a:fillRef idx="1">
-            <a:schemeClr val="accent1"/>
-          </a:fillRef>
-          <a:effectRef idx="0">
-            <a:schemeClr val="accent1"/>
-          </a:effectRef>
-          <a:fontRef idx="minor">
-            <a:schemeClr val="lt1"/>
-          </a:fontRef>
-        </p:style>
-        <p:txBody>
-          <a:bodyPr rtlCol="0" anchor="ctr"/>
-          <a:lstStyle/>
-          <a:p>
-            <a:pPr algn="ctr"/>
-            <a:endParaRPr lang="pt-BR" sz="1800">
-              <a:solidFill>
-                <a:prstClr val="white"/>
-              </a:solidFill>
-              <a:latin typeface="Calibri"/>
-            </a:endParaRPr>
-          </a:p>
-        </p:txBody>
-      </p:sp>
-      <p:sp>
-        <p:nvSpPr>
-          <p:cNvPr id="3" name="Espaço Reservado para Número de Slide 2"/>
-          <p:cNvSpPr>
-            <a:spLocks noGrp="1"/>
-          </p:cNvSpPr>
-          <p:nvPr>
-            <p:ph type="sldNum" sz="quarter" idx="4"/>
-          </p:nvPr>
-        </p:nvSpPr>
-        <p:spPr>
-          <a:xfrm>
-            <a:off x="12645557" y="7237015"/>
-            <a:ext cx="628646" cy="214290"/>
-          </a:xfrm>
-        </p:spPr>
-        <p:txBody>
-          <a:bodyPr/>
-          <a:lstStyle/>
-          <a:p>
-            <a:pPr>
-              <a:defRPr/>
-            </a:pPr>
-            <a:fld id="{B66251D2-9488-44CD-87B4-F793A73C4A01}" type="slidenum">
-              <a:rPr lang="pt-BR" smtClean="0"/>
-              <a:pPr>
-                <a:defRPr/>
-              </a:pPr>
-              <a:t>4</a:t>
-            </a:fld>
-            <a:endParaRPr lang="pt-BR" sz="880"/>
-          </a:p>
-        </p:txBody>
-      </p:sp>
-      <p:sp>
-        <p:nvSpPr>
           <p:cNvPr id="4" name="Espaço Reservado para Texto 3"/>
           <p:cNvSpPr>
             <a:spLocks noGrp="1"/>
@@ -29793,7 +29701,7 @@
         </p:nvSpPr>
         <p:spPr>
           <a:xfrm>
-            <a:off x="2184972" y="108228"/>
+            <a:off x="1858728" y="27491"/>
             <a:ext cx="11521279" cy="765639"/>
           </a:xfrm>
         </p:spPr>
@@ -29816,56 +29724,6 @@
           </a:p>
         </p:txBody>
       </p:sp>
-      <p:cxnSp>
-        <p:nvCxnSpPr>
-          <p:cNvPr id="108" name="Conector de Seta Reta 107">
-            <a:extLst>
-              <a:ext uri="{FF2B5EF4-FFF2-40B4-BE49-F238E27FC236}">
-                <a16:creationId xmlns:a16="http://schemas.microsoft.com/office/drawing/2014/main" id="{88AF183C-AF91-49F6-B2E7-A0B82E68B260}"/>
-              </a:ext>
-            </a:extLst>
-          </p:cNvPr>
-          <p:cNvCxnSpPr>
-            <a:cxnSpLocks/>
-            <a:stCxn id="58" idx="1"/>
-            <a:endCxn id="6" idx="4"/>
-          </p:cNvCxnSpPr>
-          <p:nvPr/>
-        </p:nvCxnSpPr>
-        <p:spPr>
-          <a:xfrm flipH="1" flipV="1">
-            <a:off x="2487444" y="3939518"/>
-            <a:ext cx="440901" cy="11955"/>
-          </a:xfrm>
-          <a:prstGeom prst="straightConnector1">
-            <a:avLst/>
-          </a:prstGeom>
-          <a:ln w="19050">
-            <a:solidFill>
-              <a:schemeClr val="accent5">
-                <a:lumMod val="75000"/>
-              </a:schemeClr>
-            </a:solidFill>
-            <a:prstDash val="sysDash"/>
-            <a:headEnd type="none" w="lg" len="lg"/>
-            <a:tailEnd type="triangle" w="lg" len="lg"/>
-          </a:ln>
-        </p:spPr>
-        <p:style>
-          <a:lnRef idx="1">
-            <a:schemeClr val="accent1"/>
-          </a:lnRef>
-          <a:fillRef idx="0">
-            <a:schemeClr val="accent1"/>
-          </a:fillRef>
-          <a:effectRef idx="0">
-            <a:schemeClr val="accent1"/>
-          </a:effectRef>
-          <a:fontRef idx="minor">
-            <a:schemeClr val="tx1"/>
-          </a:fontRef>
-        </p:style>
-      </p:cxnSp>
       <p:sp>
         <p:nvSpPr>
           <p:cNvPr id="100" name="Retângulo 20">
@@ -29880,7 +29738,7 @@
         </p:nvSpPr>
         <p:spPr>
           <a:xfrm>
-            <a:off x="-8896" y="3562786"/>
+            <a:off x="-169865" y="1891155"/>
             <a:ext cx="2566458" cy="1138773"/>
           </a:xfrm>
           <a:prstGeom prst="rect">
@@ -29948,58 +29806,12 @@
           </a:p>
         </p:txBody>
       </p:sp>
-      <p:sp>
-        <p:nvSpPr>
-          <p:cNvPr id="101" name="Retângulo 20">
+      <p:grpSp>
+        <p:nvGrpSpPr>
+          <p:cNvPr id="173" name="Group 79">
             <a:extLst>
               <a:ext uri="{FF2B5EF4-FFF2-40B4-BE49-F238E27FC236}">
-                <a16:creationId xmlns:a16="http://schemas.microsoft.com/office/drawing/2014/main" id="{FC798C42-61A5-3943-A3F4-72A0AB9C9EDA}"/>
-              </a:ext>
-            </a:extLst>
-          </p:cNvPr>
-          <p:cNvSpPr/>
-          <p:nvPr/>
-        </p:nvSpPr>
-        <p:spPr>
-          <a:xfrm>
-            <a:off x="434927" y="2484487"/>
-            <a:ext cx="2566458" cy="338554"/>
-          </a:xfrm>
-          <a:prstGeom prst="rect">
-            <a:avLst/>
-          </a:prstGeom>
-        </p:spPr>
-        <p:txBody>
-          <a:bodyPr wrap="square">
-            <a:spAutoFit/>
-          </a:bodyPr>
-          <a:lstStyle/>
-          <a:p>
-            <a:pPr lvl="0" algn="ctr">
-              <a:defRPr/>
-            </a:pPr>
-            <a:r>
-              <a:rPr lang="pt-BR" sz="1600" dirty="0">
-                <a:solidFill>
-                  <a:prstClr val="white"/>
-                </a:solidFill>
-              </a:rPr>
-              <a:t>Armazena os dados.</a:t>
-            </a:r>
-            <a:endParaRPr lang="pt-BR" sz="1200" dirty="0">
-              <a:solidFill>
-                <a:prstClr val="white"/>
-              </a:solidFill>
-            </a:endParaRPr>
-          </a:p>
-        </p:txBody>
-      </p:sp>
-      <p:grpSp>
-        <p:nvGrpSpPr>
-          <p:cNvPr id="57" name="Group 79">
-            <a:extLst>
-              <a:ext uri="{FF2B5EF4-FFF2-40B4-BE49-F238E27FC236}">
-                <a16:creationId xmlns:a16="http://schemas.microsoft.com/office/drawing/2014/main" id="{EDA1A6A0-10A3-4138-8F31-5CDE1B0652D0}"/>
+                <a16:creationId xmlns:a16="http://schemas.microsoft.com/office/drawing/2014/main" id="{87264381-DC0D-430C-99B7-95A02251A024}"/>
               </a:ext>
             </a:extLst>
           </p:cNvPr>
@@ -30008,7 +29820,7 @@
         </p:nvGrpSpPr>
         <p:grpSpPr>
           <a:xfrm>
-            <a:off x="2850577" y="3225943"/>
+            <a:off x="2035873" y="3288972"/>
             <a:ext cx="2110740" cy="1494815"/>
             <a:chOff x="3258758" y="4711163"/>
             <a:chExt cx="2814159" cy="2109171"/>
@@ -30016,10 +29828,10 @@
         </p:grpSpPr>
         <p:sp>
           <p:nvSpPr>
-            <p:cNvPr id="58" name="Retângulo 57">
+            <p:cNvPr id="174" name="Retângulo 173">
               <a:extLst>
                 <a:ext uri="{FF2B5EF4-FFF2-40B4-BE49-F238E27FC236}">
-                  <a16:creationId xmlns:a16="http://schemas.microsoft.com/office/drawing/2014/main" id="{4000FE8E-6356-42EC-AF6C-746EC6A19251}"/>
+                  <a16:creationId xmlns:a16="http://schemas.microsoft.com/office/drawing/2014/main" id="{98D7A7FA-ADAE-4853-8553-1E8EF1B1B868}"/>
                 </a:ext>
               </a:extLst>
             </p:cNvPr>
@@ -30077,10 +29889,10 @@
         </p:sp>
         <p:sp>
           <p:nvSpPr>
-            <p:cNvPr id="59" name="Retângulo 58">
+            <p:cNvPr id="175" name="Retângulo 174">
               <a:extLst>
                 <a:ext uri="{FF2B5EF4-FFF2-40B4-BE49-F238E27FC236}">
-                  <a16:creationId xmlns:a16="http://schemas.microsoft.com/office/drawing/2014/main" id="{FB904B6E-7224-4428-8476-BF7DDC730520}"/>
+                  <a16:creationId xmlns:a16="http://schemas.microsoft.com/office/drawing/2014/main" id="{506B6F93-D299-4185-AEE1-81A485281E85}"/>
                 </a:ext>
               </a:extLst>
             </p:cNvPr>
@@ -30118,10 +29930,10 @@
         </p:sp>
         <p:sp>
           <p:nvSpPr>
-            <p:cNvPr id="62" name="Retângulo 20">
+            <p:cNvPr id="176" name="Retângulo 20">
               <a:extLst>
                 <a:ext uri="{FF2B5EF4-FFF2-40B4-BE49-F238E27FC236}">
-                  <a16:creationId xmlns:a16="http://schemas.microsoft.com/office/drawing/2014/main" id="{898445EF-0450-4939-9A2F-3F0009C0FE74}"/>
+                  <a16:creationId xmlns:a16="http://schemas.microsoft.com/office/drawing/2014/main" id="{E36C3076-05D0-40D7-9A83-F32EBD1BACE4}"/>
                 </a:ext>
               </a:extLst>
             </p:cNvPr>
@@ -30189,10 +30001,10 @@
       </p:grpSp>
       <p:grpSp>
         <p:nvGrpSpPr>
-          <p:cNvPr id="83" name="Group 38">
+          <p:cNvPr id="177" name="Group 38">
             <a:extLst>
               <a:ext uri="{FF2B5EF4-FFF2-40B4-BE49-F238E27FC236}">
-                <a16:creationId xmlns:a16="http://schemas.microsoft.com/office/drawing/2014/main" id="{39FBAFE6-4F58-439D-9C6F-AFAB6C6F6539}"/>
+                <a16:creationId xmlns:a16="http://schemas.microsoft.com/office/drawing/2014/main" id="{B562F01E-5B52-422D-A385-E560A21E1A6A}"/>
               </a:ext>
             </a:extLst>
           </p:cNvPr>
@@ -30201,7 +30013,7 @@
         </p:nvGrpSpPr>
         <p:grpSpPr>
           <a:xfrm>
-            <a:off x="6029776" y="1059957"/>
+            <a:off x="5215072" y="1122986"/>
             <a:ext cx="2118784" cy="1440000"/>
             <a:chOff x="8813686" y="1524475"/>
             <a:chExt cx="2588120" cy="2016224"/>
@@ -30209,10 +30021,10 @@
         </p:grpSpPr>
         <p:sp>
           <p:nvSpPr>
-            <p:cNvPr id="84" name="Retângulo 83">
+            <p:cNvPr id="178" name="Retângulo 177">
               <a:extLst>
                 <a:ext uri="{FF2B5EF4-FFF2-40B4-BE49-F238E27FC236}">
-                  <a16:creationId xmlns:a16="http://schemas.microsoft.com/office/drawing/2014/main" id="{FBE9AE95-6A8E-499D-8249-8B0D3FE154AE}"/>
+                  <a16:creationId xmlns:a16="http://schemas.microsoft.com/office/drawing/2014/main" id="{3CA7FEE3-853A-4676-B1F5-E414A2FD9F1A}"/>
                 </a:ext>
               </a:extLst>
             </p:cNvPr>
@@ -30267,10 +30079,10 @@
         </p:sp>
         <p:sp>
           <p:nvSpPr>
-            <p:cNvPr id="87" name="Retângulo 86">
+            <p:cNvPr id="179" name="Retângulo 178">
               <a:extLst>
                 <a:ext uri="{FF2B5EF4-FFF2-40B4-BE49-F238E27FC236}">
-                  <a16:creationId xmlns:a16="http://schemas.microsoft.com/office/drawing/2014/main" id="{C17C8BE1-3AF4-48F1-8BEC-C85D77E8F999}"/>
+                  <a16:creationId xmlns:a16="http://schemas.microsoft.com/office/drawing/2014/main" id="{D71B383A-25C6-4B47-9B64-E3B01900706B}"/>
                 </a:ext>
               </a:extLst>
             </p:cNvPr>
@@ -30382,10 +30194,10 @@
         </p:sp>
         <p:sp>
           <p:nvSpPr>
-            <p:cNvPr id="88" name="Retângulo 20">
+            <p:cNvPr id="180" name="Retângulo 20">
               <a:extLst>
                 <a:ext uri="{FF2B5EF4-FFF2-40B4-BE49-F238E27FC236}">
-                  <a16:creationId xmlns:a16="http://schemas.microsoft.com/office/drawing/2014/main" id="{2A44DCE7-B848-40FC-8984-3B25F40DE9B9}"/>
+                  <a16:creationId xmlns:a16="http://schemas.microsoft.com/office/drawing/2014/main" id="{F5E12BB5-F203-4C42-86C4-0F331149BF6D}"/>
                 </a:ext>
               </a:extLst>
             </p:cNvPr>
@@ -30458,10 +30270,10 @@
       </p:grpSp>
       <p:grpSp>
         <p:nvGrpSpPr>
-          <p:cNvPr id="89" name="Group 38">
+          <p:cNvPr id="181" name="Group 38">
             <a:extLst>
               <a:ext uri="{FF2B5EF4-FFF2-40B4-BE49-F238E27FC236}">
-                <a16:creationId xmlns:a16="http://schemas.microsoft.com/office/drawing/2014/main" id="{328A115B-B062-4627-ABED-EF820E5DE0F6}"/>
+                <a16:creationId xmlns:a16="http://schemas.microsoft.com/office/drawing/2014/main" id="{869A8427-ECD6-4A71-AD6B-D42D10AC7256}"/>
               </a:ext>
             </a:extLst>
           </p:cNvPr>
@@ -30470,7 +30282,7 @@
         </p:nvGrpSpPr>
         <p:grpSpPr>
           <a:xfrm>
-            <a:off x="3622298" y="1044487"/>
+            <a:off x="2807594" y="1107516"/>
             <a:ext cx="2159999" cy="1440000"/>
             <a:chOff x="8788108" y="1515280"/>
             <a:chExt cx="2638465" cy="2016224"/>
@@ -30478,10 +30290,10 @@
         </p:grpSpPr>
         <p:sp>
           <p:nvSpPr>
-            <p:cNvPr id="90" name="Retângulo 89">
+            <p:cNvPr id="182" name="Retângulo 181">
               <a:extLst>
                 <a:ext uri="{FF2B5EF4-FFF2-40B4-BE49-F238E27FC236}">
-                  <a16:creationId xmlns:a16="http://schemas.microsoft.com/office/drawing/2014/main" id="{FF6A9949-8A4B-4867-A92F-C81E3064B0E5}"/>
+                  <a16:creationId xmlns:a16="http://schemas.microsoft.com/office/drawing/2014/main" id="{4ACE845B-E5F6-4C36-9145-A688F3A45C50}"/>
                 </a:ext>
               </a:extLst>
             </p:cNvPr>
@@ -30530,10 +30342,10 @@
         </p:sp>
         <p:sp>
           <p:nvSpPr>
-            <p:cNvPr id="91" name="Retângulo 90">
+            <p:cNvPr id="183" name="Retângulo 182">
               <a:extLst>
                 <a:ext uri="{FF2B5EF4-FFF2-40B4-BE49-F238E27FC236}">
-                  <a16:creationId xmlns:a16="http://schemas.microsoft.com/office/drawing/2014/main" id="{288B414D-5D6A-4B1F-AEC6-931B25D9821B}"/>
+                  <a16:creationId xmlns:a16="http://schemas.microsoft.com/office/drawing/2014/main" id="{15226A42-900F-413E-9042-62E938AB6685}"/>
                 </a:ext>
               </a:extLst>
             </p:cNvPr>
@@ -30645,10 +30457,10 @@
         </p:sp>
         <p:sp>
           <p:nvSpPr>
-            <p:cNvPr id="92" name="Retângulo 20">
+            <p:cNvPr id="184" name="Retângulo 183">
               <a:extLst>
                 <a:ext uri="{FF2B5EF4-FFF2-40B4-BE49-F238E27FC236}">
-                  <a16:creationId xmlns:a16="http://schemas.microsoft.com/office/drawing/2014/main" id="{F53FF2C7-85BB-4F9F-A0E1-036D27E63E6D}"/>
+                  <a16:creationId xmlns:a16="http://schemas.microsoft.com/office/drawing/2014/main" id="{3EF77FA4-7F49-43BC-A7E1-6F38EE3B9E86}"/>
                 </a:ext>
               </a:extLst>
             </p:cNvPr>
@@ -30708,10 +30520,10 @@
       </p:grpSp>
       <p:grpSp>
         <p:nvGrpSpPr>
-          <p:cNvPr id="118" name="Group 38">
+          <p:cNvPr id="185" name="Group 38">
             <a:extLst>
               <a:ext uri="{FF2B5EF4-FFF2-40B4-BE49-F238E27FC236}">
-                <a16:creationId xmlns:a16="http://schemas.microsoft.com/office/drawing/2014/main" id="{34BE92CC-7EF5-4A48-81E4-3276F6679A73}"/>
+                <a16:creationId xmlns:a16="http://schemas.microsoft.com/office/drawing/2014/main" id="{A3F1D50D-78B5-4490-BAD4-1399E3B558EB}"/>
               </a:ext>
             </a:extLst>
           </p:cNvPr>
@@ -30720,7 +30532,7 @@
         </p:nvGrpSpPr>
         <p:grpSpPr>
           <a:xfrm>
-            <a:off x="8631821" y="1024789"/>
+            <a:off x="7817117" y="1087818"/>
             <a:ext cx="2109343" cy="1752678"/>
             <a:chOff x="8825218" y="1524475"/>
             <a:chExt cx="2576587" cy="2086678"/>
@@ -30728,10 +30540,10 @@
         </p:grpSpPr>
         <p:sp>
           <p:nvSpPr>
-            <p:cNvPr id="119" name="Retângulo 118">
+            <p:cNvPr id="186" name="Retângulo 185">
               <a:extLst>
                 <a:ext uri="{FF2B5EF4-FFF2-40B4-BE49-F238E27FC236}">
-                  <a16:creationId xmlns:a16="http://schemas.microsoft.com/office/drawing/2014/main" id="{B03554D8-2316-438C-A347-A4E9F8381E79}"/>
+                  <a16:creationId xmlns:a16="http://schemas.microsoft.com/office/drawing/2014/main" id="{D1835B2B-EAB5-438E-9EFC-19B25808B793}"/>
                 </a:ext>
               </a:extLst>
             </p:cNvPr>
@@ -30780,10 +30592,10 @@
         </p:sp>
         <p:sp>
           <p:nvSpPr>
-            <p:cNvPr id="120" name="Retângulo 119">
+            <p:cNvPr id="187" name="Retângulo 186">
               <a:extLst>
                 <a:ext uri="{FF2B5EF4-FFF2-40B4-BE49-F238E27FC236}">
-                  <a16:creationId xmlns:a16="http://schemas.microsoft.com/office/drawing/2014/main" id="{30DF4EA6-9B4B-4AC9-91E7-626950DA859B}"/>
+                  <a16:creationId xmlns:a16="http://schemas.microsoft.com/office/drawing/2014/main" id="{00F96C11-9967-4933-AAE0-6931916E8D95}"/>
                 </a:ext>
               </a:extLst>
             </p:cNvPr>
@@ -30903,10 +30715,10 @@
         </p:sp>
         <p:sp>
           <p:nvSpPr>
-            <p:cNvPr id="121" name="Retângulo 20">
+            <p:cNvPr id="188" name="Retângulo 20">
               <a:extLst>
                 <a:ext uri="{FF2B5EF4-FFF2-40B4-BE49-F238E27FC236}">
-                  <a16:creationId xmlns:a16="http://schemas.microsoft.com/office/drawing/2014/main" id="{10D028BC-DB3B-4D5E-B113-B4F7BBFB690B}"/>
+                  <a16:creationId xmlns:a16="http://schemas.microsoft.com/office/drawing/2014/main" id="{E031E42A-D3D0-41C7-B833-0C82C287DBC5}"/>
                 </a:ext>
               </a:extLst>
             </p:cNvPr>
@@ -30950,10 +30762,10 @@
       </p:grpSp>
       <p:grpSp>
         <p:nvGrpSpPr>
-          <p:cNvPr id="135" name="Group 36">
+          <p:cNvPr id="189" name="Group 36">
             <a:extLst>
               <a:ext uri="{FF2B5EF4-FFF2-40B4-BE49-F238E27FC236}">
-                <a16:creationId xmlns:a16="http://schemas.microsoft.com/office/drawing/2014/main" id="{B7430326-65D4-4D70-A1C5-05F48B10C866}"/>
+                <a16:creationId xmlns:a16="http://schemas.microsoft.com/office/drawing/2014/main" id="{B97455B1-C095-4B20-8B5B-2C2559BC97FF}"/>
               </a:ext>
             </a:extLst>
           </p:cNvPr>
@@ -30962,18 +30774,18 @@
         </p:nvGrpSpPr>
         <p:grpSpPr>
           <a:xfrm>
-            <a:off x="11971163" y="2802920"/>
-            <a:ext cx="2707534" cy="1766413"/>
+            <a:off x="11156459" y="3067486"/>
+            <a:ext cx="2181258" cy="2690947"/>
             <a:chOff x="7014179" y="4654462"/>
-            <a:chExt cx="2675302" cy="2016225"/>
+            <a:chExt cx="2675302" cy="2395031"/>
           </a:xfrm>
         </p:grpSpPr>
         <p:grpSp>
           <p:nvGrpSpPr>
-            <p:cNvPr id="136" name="Group 22">
+            <p:cNvPr id="190" name="Group 22">
               <a:extLst>
                 <a:ext uri="{FF2B5EF4-FFF2-40B4-BE49-F238E27FC236}">
-                  <a16:creationId xmlns:a16="http://schemas.microsoft.com/office/drawing/2014/main" id="{3DBA05EC-4AC6-4628-BE7D-AC2F85D7C159}"/>
+                  <a16:creationId xmlns:a16="http://schemas.microsoft.com/office/drawing/2014/main" id="{5B93BAEC-FD80-4AFF-B223-FCED38021963}"/>
                 </a:ext>
               </a:extLst>
             </p:cNvPr>
@@ -30983,17 +30795,17 @@
           <p:grpSpPr>
             <a:xfrm>
               <a:off x="7149338" y="4654462"/>
-              <a:ext cx="2463283" cy="2016225"/>
+              <a:ext cx="2463283" cy="2174131"/>
               <a:chOff x="8392958" y="3891083"/>
-              <a:chExt cx="3276202" cy="2212133"/>
+              <a:chExt cx="3276202" cy="2385382"/>
             </a:xfrm>
           </p:grpSpPr>
           <p:sp>
             <p:nvSpPr>
-              <p:cNvPr id="139" name="Retângulo 6">
+              <p:cNvPr id="193" name="Retângulo 6">
                 <a:extLst>
                   <a:ext uri="{FF2B5EF4-FFF2-40B4-BE49-F238E27FC236}">
-                    <a16:creationId xmlns:a16="http://schemas.microsoft.com/office/drawing/2014/main" id="{7D8600E2-413A-40FD-B87C-2A335615AA94}"/>
+                    <a16:creationId xmlns:a16="http://schemas.microsoft.com/office/drawing/2014/main" id="{ACAAD74D-1E31-45CF-BB1E-80E0D71AE898}"/>
                   </a:ext>
                 </a:extLst>
               </p:cNvPr>
@@ -31003,7 +30815,7 @@
             <p:spPr>
               <a:xfrm>
                 <a:off x="8392958" y="3891083"/>
-                <a:ext cx="3276202" cy="2212133"/>
+                <a:ext cx="3276202" cy="2385382"/>
               </a:xfrm>
               <a:prstGeom prst="rect">
                 <a:avLst/>
@@ -31040,7 +30852,7 @@
               <a:lstStyle/>
               <a:p>
                 <a:pPr algn="ctr"/>
-                <a:endParaRPr lang="pt-BR">
+                <a:endParaRPr lang="pt-BR" dirty="0">
                   <a:solidFill>
                     <a:prstClr val="white"/>
                   </a:solidFill>
@@ -31051,10 +30863,10 @@
           </p:sp>
           <p:sp>
             <p:nvSpPr>
-              <p:cNvPr id="140" name="Retângulo 6">
+              <p:cNvPr id="194" name="Retângulo 6">
                 <a:extLst>
                   <a:ext uri="{FF2B5EF4-FFF2-40B4-BE49-F238E27FC236}">
-                    <a16:creationId xmlns:a16="http://schemas.microsoft.com/office/drawing/2014/main" id="{DF9D8653-1050-4E43-8439-9F43C5F848CD}"/>
+                    <a16:creationId xmlns:a16="http://schemas.microsoft.com/office/drawing/2014/main" id="{A4DA75C9-056F-41CC-A931-A9A508AA71CC}"/>
                   </a:ext>
                 </a:extLst>
               </p:cNvPr>
@@ -31110,10 +30922,10 @@
           </p:sp>
           <p:sp>
             <p:nvSpPr>
-              <p:cNvPr id="141" name="Multiply 18">
+              <p:cNvPr id="195" name="Multiply 18">
                 <a:extLst>
                   <a:ext uri="{FF2B5EF4-FFF2-40B4-BE49-F238E27FC236}">
-                    <a16:creationId xmlns:a16="http://schemas.microsoft.com/office/drawing/2014/main" id="{44D62C31-1914-4749-9593-A0BCFBF6BF97}"/>
+                    <a16:creationId xmlns:a16="http://schemas.microsoft.com/office/drawing/2014/main" id="{C5733A6F-7BE0-4EB4-97CC-E48AFB53C568}"/>
                   </a:ext>
                 </a:extLst>
               </p:cNvPr>
@@ -31164,10 +30976,10 @@
           </p:sp>
           <p:sp>
             <p:nvSpPr>
-              <p:cNvPr id="142" name="Circular Arrow 19">
+              <p:cNvPr id="196" name="Circular Arrow 19">
                 <a:extLst>
                   <a:ext uri="{FF2B5EF4-FFF2-40B4-BE49-F238E27FC236}">
-                    <a16:creationId xmlns:a16="http://schemas.microsoft.com/office/drawing/2014/main" id="{F5218C13-846B-47DA-84FF-561A9EAE035F}"/>
+                    <a16:creationId xmlns:a16="http://schemas.microsoft.com/office/drawing/2014/main" id="{14F2D35F-5E8D-4059-93AC-9DCC52037E25}"/>
                   </a:ext>
                 </a:extLst>
               </p:cNvPr>
@@ -31223,10 +31035,10 @@
         </p:grpSp>
         <p:sp>
           <p:nvSpPr>
-            <p:cNvPr id="137" name="Retângulo 20">
+            <p:cNvPr id="191" name="Retângulo 20">
               <a:extLst>
                 <a:ext uri="{FF2B5EF4-FFF2-40B4-BE49-F238E27FC236}">
-                  <a16:creationId xmlns:a16="http://schemas.microsoft.com/office/drawing/2014/main" id="{35061AC3-B772-4F8A-A020-79283BF2EF88}"/>
+                  <a16:creationId xmlns:a16="http://schemas.microsoft.com/office/drawing/2014/main" id="{C3FA246E-0934-4C0A-AF20-ED53CBEDF7A6}"/>
                 </a:ext>
               </a:extLst>
             </p:cNvPr>
@@ -31301,10 +31113,10 @@
         </p:sp>
         <p:sp>
           <p:nvSpPr>
-            <p:cNvPr id="138" name="Retângulo 20">
+            <p:cNvPr id="192" name="Retângulo 20">
               <a:extLst>
                 <a:ext uri="{FF2B5EF4-FFF2-40B4-BE49-F238E27FC236}">
-                  <a16:creationId xmlns:a16="http://schemas.microsoft.com/office/drawing/2014/main" id="{591DBD71-2751-4717-89D0-4BA653D10704}"/>
+                  <a16:creationId xmlns:a16="http://schemas.microsoft.com/office/drawing/2014/main" id="{ED6F8E77-3734-49A2-833C-CF6F076A3F22}"/>
                 </a:ext>
               </a:extLst>
             </p:cNvPr>
@@ -31314,7 +31126,7 @@
           <p:spPr>
             <a:xfrm>
               <a:off x="7123023" y="5819931"/>
-              <a:ext cx="2566458" cy="667476"/>
+              <a:ext cx="2566458" cy="1229562"/>
             </a:xfrm>
             <a:prstGeom prst="rect">
               <a:avLst/>
@@ -31335,7 +31147,7 @@
                     <a:prstClr val="white"/>
                   </a:solidFill>
                 </a:rPr>
-                <a:t>Dashboard e login, cadastro,</a:t>
+                <a:t>Dashboard e login,</a:t>
               </a:r>
             </a:p>
             <a:p>
@@ -31348,7 +31160,33 @@
                     <a:prstClr val="white"/>
                   </a:solidFill>
                 </a:rPr>
-                <a:t>Home, tela de vídeos e perfil</a:t>
+                <a:t> cadastro,</a:t>
+              </a:r>
+            </a:p>
+            <a:p>
+              <a:pPr lvl="0" algn="ctr">
+                <a:defRPr/>
+              </a:pPr>
+              <a:r>
+                <a:rPr lang="pt-BR" sz="1600" dirty="0">
+                  <a:solidFill>
+                    <a:prstClr val="white"/>
+                  </a:solidFill>
+                </a:rPr>
+                <a:t>Home, tela de vídeos</a:t>
+              </a:r>
+            </a:p>
+            <a:p>
+              <a:pPr lvl="0" algn="ctr">
+                <a:defRPr/>
+              </a:pPr>
+              <a:r>
+                <a:rPr lang="pt-BR" sz="1600" dirty="0">
+                  <a:solidFill>
+                    <a:prstClr val="white"/>
+                  </a:solidFill>
+                </a:rPr>
+                <a:t> e perfil</a:t>
               </a:r>
               <a:endParaRPr lang="pt-BR" sz="1200" dirty="0">
                 <a:solidFill>
@@ -31361,10 +31199,10 @@
       </p:grpSp>
       <p:grpSp>
         <p:nvGrpSpPr>
-          <p:cNvPr id="63" name="Group 38">
+          <p:cNvPr id="197" name="Group 38">
             <a:extLst>
               <a:ext uri="{FF2B5EF4-FFF2-40B4-BE49-F238E27FC236}">
-                <a16:creationId xmlns:a16="http://schemas.microsoft.com/office/drawing/2014/main" id="{224350EB-A3F6-4E03-BDAE-E39A398A714C}"/>
+                <a16:creationId xmlns:a16="http://schemas.microsoft.com/office/drawing/2014/main" id="{9932AB66-80D4-442E-9AFF-A9BA476221C3}"/>
               </a:ext>
             </a:extLst>
           </p:cNvPr>
@@ -31373,7 +31211,7 @@
         </p:nvGrpSpPr>
         <p:grpSpPr>
           <a:xfrm>
-            <a:off x="2902810" y="5248569"/>
+            <a:off x="2088106" y="5311598"/>
             <a:ext cx="2109344" cy="1693501"/>
             <a:chOff x="8825218" y="1524475"/>
             <a:chExt cx="2576588" cy="2016224"/>
@@ -31381,10 +31219,10 @@
         </p:grpSpPr>
         <p:sp>
           <p:nvSpPr>
-            <p:cNvPr id="64" name="Retângulo 63">
+            <p:cNvPr id="198" name="Retângulo 197">
               <a:extLst>
                 <a:ext uri="{FF2B5EF4-FFF2-40B4-BE49-F238E27FC236}">
-                  <a16:creationId xmlns:a16="http://schemas.microsoft.com/office/drawing/2014/main" id="{086E046C-B2BE-498B-A80B-7F88DD03A0A4}"/>
+                  <a16:creationId xmlns:a16="http://schemas.microsoft.com/office/drawing/2014/main" id="{E02F05B7-6739-4AE3-A3B8-586C71D47E06}"/>
                 </a:ext>
               </a:extLst>
             </p:cNvPr>
@@ -31433,10 +31271,10 @@
         </p:sp>
         <p:sp>
           <p:nvSpPr>
-            <p:cNvPr id="65" name="Retângulo 64">
+            <p:cNvPr id="199" name="Retângulo 198">
               <a:extLst>
                 <a:ext uri="{FF2B5EF4-FFF2-40B4-BE49-F238E27FC236}">
-                  <a16:creationId xmlns:a16="http://schemas.microsoft.com/office/drawing/2014/main" id="{36AA3E55-819C-4552-A1A5-3A1250ED28AE}"/>
+                  <a16:creationId xmlns:a16="http://schemas.microsoft.com/office/drawing/2014/main" id="{CFE3C8DF-49AF-48F1-A62E-943971D45418}"/>
                 </a:ext>
               </a:extLst>
             </p:cNvPr>
@@ -31556,10 +31394,10 @@
         </p:sp>
         <p:sp>
           <p:nvSpPr>
-            <p:cNvPr id="66" name="Retângulo 20">
+            <p:cNvPr id="200" name="Retângulo 20">
               <a:extLst>
                 <a:ext uri="{FF2B5EF4-FFF2-40B4-BE49-F238E27FC236}">
-                  <a16:creationId xmlns:a16="http://schemas.microsoft.com/office/drawing/2014/main" id="{6A0EFEBC-7EAD-46F4-9B03-8946DB349322}"/>
+                  <a16:creationId xmlns:a16="http://schemas.microsoft.com/office/drawing/2014/main" id="{BB6999F6-A734-490F-9E06-A279114119E8}"/>
                 </a:ext>
               </a:extLst>
             </p:cNvPr>
@@ -31611,10 +31449,10 @@
       </p:grpSp>
       <p:grpSp>
         <p:nvGrpSpPr>
-          <p:cNvPr id="77" name="Group 38">
+          <p:cNvPr id="201" name="Group 38">
             <a:extLst>
               <a:ext uri="{FF2B5EF4-FFF2-40B4-BE49-F238E27FC236}">
-                <a16:creationId xmlns:a16="http://schemas.microsoft.com/office/drawing/2014/main" id="{52178681-6EA0-4C55-92BF-592D9811F23B}"/>
+                <a16:creationId xmlns:a16="http://schemas.microsoft.com/office/drawing/2014/main" id="{695AEB27-9DD3-47AE-8CC7-A4973EF0DBD3}"/>
               </a:ext>
             </a:extLst>
           </p:cNvPr>
@@ -31623,7 +31461,7 @@
         </p:nvGrpSpPr>
         <p:grpSpPr>
           <a:xfrm>
-            <a:off x="5178235" y="5248569"/>
+            <a:off x="4363531" y="5311598"/>
             <a:ext cx="2107508" cy="1693501"/>
             <a:chOff x="8827461" y="1524475"/>
             <a:chExt cx="2574345" cy="2016224"/>
@@ -31631,10 +31469,10 @@
         </p:grpSpPr>
         <p:sp>
           <p:nvSpPr>
-            <p:cNvPr id="78" name="Retângulo 77">
+            <p:cNvPr id="202" name="Retângulo 201">
               <a:extLst>
                 <a:ext uri="{FF2B5EF4-FFF2-40B4-BE49-F238E27FC236}">
-                  <a16:creationId xmlns:a16="http://schemas.microsoft.com/office/drawing/2014/main" id="{56B037CD-E1E7-4F2A-BE26-0B32FD42C92F}"/>
+                  <a16:creationId xmlns:a16="http://schemas.microsoft.com/office/drawing/2014/main" id="{A379DEA0-0728-401B-B424-F248F20E3BF9}"/>
                 </a:ext>
               </a:extLst>
             </p:cNvPr>
@@ -31683,10 +31521,10 @@
         </p:sp>
         <p:sp>
           <p:nvSpPr>
-            <p:cNvPr id="79" name="Retângulo 78">
+            <p:cNvPr id="203" name="Retângulo 202">
               <a:extLst>
                 <a:ext uri="{FF2B5EF4-FFF2-40B4-BE49-F238E27FC236}">
-                  <a16:creationId xmlns:a16="http://schemas.microsoft.com/office/drawing/2014/main" id="{A67F9F3A-1689-4564-A31A-8B0D5ED72772}"/>
+                  <a16:creationId xmlns:a16="http://schemas.microsoft.com/office/drawing/2014/main" id="{0418AEC8-B480-4E0E-B017-74A7DAB69D86}"/>
                 </a:ext>
               </a:extLst>
             </p:cNvPr>
@@ -31790,10 +31628,10 @@
         </p:sp>
         <p:sp>
           <p:nvSpPr>
-            <p:cNvPr id="80" name="Retângulo 20">
+            <p:cNvPr id="204" name="Retângulo 20">
               <a:extLst>
                 <a:ext uri="{FF2B5EF4-FFF2-40B4-BE49-F238E27FC236}">
-                  <a16:creationId xmlns:a16="http://schemas.microsoft.com/office/drawing/2014/main" id="{DFC3C6C5-B87C-4A4F-9A0C-1007FAA25693}"/>
+                  <a16:creationId xmlns:a16="http://schemas.microsoft.com/office/drawing/2014/main" id="{7780CA86-9E7E-43B4-85BC-C5BE02F169D3}"/>
                 </a:ext>
               </a:extLst>
             </p:cNvPr>
@@ -31837,10 +31675,10 @@
       </p:grpSp>
       <p:grpSp>
         <p:nvGrpSpPr>
-          <p:cNvPr id="81" name="Group 38">
+          <p:cNvPr id="205" name="Group 38">
             <a:extLst>
               <a:ext uri="{FF2B5EF4-FFF2-40B4-BE49-F238E27FC236}">
-                <a16:creationId xmlns:a16="http://schemas.microsoft.com/office/drawing/2014/main" id="{7582C09F-3401-425E-897C-EEA7B8BC4C93}"/>
+                <a16:creationId xmlns:a16="http://schemas.microsoft.com/office/drawing/2014/main" id="{038E14F9-FCA3-4773-889B-128534CC6458}"/>
               </a:ext>
             </a:extLst>
           </p:cNvPr>
@@ -31849,7 +31687,7 @@
         </p:nvGrpSpPr>
         <p:grpSpPr>
           <a:xfrm>
-            <a:off x="7461874" y="5218979"/>
+            <a:off x="6647170" y="5282008"/>
             <a:ext cx="2109344" cy="1693501"/>
             <a:chOff x="8825218" y="1524475"/>
             <a:chExt cx="2576588" cy="2016224"/>
@@ -31857,10 +31695,10 @@
         </p:grpSpPr>
         <p:sp>
           <p:nvSpPr>
-            <p:cNvPr id="82" name="Retângulo 81">
+            <p:cNvPr id="206" name="Retângulo 205">
               <a:extLst>
                 <a:ext uri="{FF2B5EF4-FFF2-40B4-BE49-F238E27FC236}">
-                  <a16:creationId xmlns:a16="http://schemas.microsoft.com/office/drawing/2014/main" id="{B86B7649-5E4B-4AB8-81F7-146927260E04}"/>
+                  <a16:creationId xmlns:a16="http://schemas.microsoft.com/office/drawing/2014/main" id="{620898AF-10A6-40C4-8688-BDD6A891E93C}"/>
                 </a:ext>
               </a:extLst>
             </p:cNvPr>
@@ -31909,10 +31747,10 @@
         </p:sp>
         <p:sp>
           <p:nvSpPr>
-            <p:cNvPr id="86" name="Retângulo 85">
+            <p:cNvPr id="207" name="Retângulo 206">
               <a:extLst>
                 <a:ext uri="{FF2B5EF4-FFF2-40B4-BE49-F238E27FC236}">
-                  <a16:creationId xmlns:a16="http://schemas.microsoft.com/office/drawing/2014/main" id="{426931CF-D183-4C2F-A8CF-1F6CDC1651E9}"/>
+                  <a16:creationId xmlns:a16="http://schemas.microsoft.com/office/drawing/2014/main" id="{256BF3F5-0299-4BC9-BFCF-0048BBF53A42}"/>
                 </a:ext>
               </a:extLst>
             </p:cNvPr>
@@ -32034,10 +31872,10 @@
         </p:sp>
         <p:sp>
           <p:nvSpPr>
-            <p:cNvPr id="93" name="Retângulo 20">
+            <p:cNvPr id="208" name="Retângulo 20">
               <a:extLst>
                 <a:ext uri="{FF2B5EF4-FFF2-40B4-BE49-F238E27FC236}">
-                  <a16:creationId xmlns:a16="http://schemas.microsoft.com/office/drawing/2014/main" id="{6791F56C-2D13-44FB-B9AE-B1C1031932F3}"/>
+                  <a16:creationId xmlns:a16="http://schemas.microsoft.com/office/drawing/2014/main" id="{7BD03528-06E8-4A7C-B0F6-B52A6E94BA4C}"/>
                 </a:ext>
               </a:extLst>
             </p:cNvPr>
@@ -32076,10 +31914,10 @@
       </p:grpSp>
       <p:grpSp>
         <p:nvGrpSpPr>
-          <p:cNvPr id="94" name="Group 38">
+          <p:cNvPr id="209" name="Group 38">
             <a:extLst>
               <a:ext uri="{FF2B5EF4-FFF2-40B4-BE49-F238E27FC236}">
-                <a16:creationId xmlns:a16="http://schemas.microsoft.com/office/drawing/2014/main" id="{4D55EEFC-830F-41FA-84AF-D10688431773}"/>
+                <a16:creationId xmlns:a16="http://schemas.microsoft.com/office/drawing/2014/main" id="{DA0D8F53-67CC-4415-A02B-34C234055302}"/>
               </a:ext>
             </a:extLst>
           </p:cNvPr>
@@ -32088,7 +31926,7 @@
         </p:nvGrpSpPr>
         <p:grpSpPr>
           <a:xfrm>
-            <a:off x="9547638" y="5241293"/>
+            <a:off x="8732934" y="5304322"/>
             <a:ext cx="2123776" cy="1749614"/>
             <a:chOff x="8807589" y="1524475"/>
             <a:chExt cx="2594217" cy="2083030"/>
@@ -32096,10 +31934,10 @@
         </p:grpSpPr>
         <p:sp>
           <p:nvSpPr>
-            <p:cNvPr id="95" name="Retângulo 94">
+            <p:cNvPr id="210" name="Retângulo 209">
               <a:extLst>
                 <a:ext uri="{FF2B5EF4-FFF2-40B4-BE49-F238E27FC236}">
-                  <a16:creationId xmlns:a16="http://schemas.microsoft.com/office/drawing/2014/main" id="{8C2D6942-4994-41BC-A391-0753915A6025}"/>
+                  <a16:creationId xmlns:a16="http://schemas.microsoft.com/office/drawing/2014/main" id="{1386B9E7-2227-4B8B-B36A-5F6EF6F6D313}"/>
                 </a:ext>
               </a:extLst>
             </p:cNvPr>
@@ -32148,10 +31986,10 @@
         </p:sp>
         <p:sp>
           <p:nvSpPr>
-            <p:cNvPr id="96" name="Retângulo 95">
+            <p:cNvPr id="211" name="Retângulo 210">
               <a:extLst>
                 <a:ext uri="{FF2B5EF4-FFF2-40B4-BE49-F238E27FC236}">
-                  <a16:creationId xmlns:a16="http://schemas.microsoft.com/office/drawing/2014/main" id="{220CBB34-127C-4D3A-AD0F-F5B5D5C3B48E}"/>
+                  <a16:creationId xmlns:a16="http://schemas.microsoft.com/office/drawing/2014/main" id="{2B985A17-1444-4207-AAE6-B56CDFC3625A}"/>
                 </a:ext>
               </a:extLst>
             </p:cNvPr>
@@ -32271,10 +32109,10 @@
         </p:sp>
         <p:sp>
           <p:nvSpPr>
-            <p:cNvPr id="97" name="Retângulo 20">
+            <p:cNvPr id="212" name="Retângulo 20">
               <a:extLst>
                 <a:ext uri="{FF2B5EF4-FFF2-40B4-BE49-F238E27FC236}">
-                  <a16:creationId xmlns:a16="http://schemas.microsoft.com/office/drawing/2014/main" id="{4885EC10-262E-43F4-BB60-ACFF9048663A}"/>
+                  <a16:creationId xmlns:a16="http://schemas.microsoft.com/office/drawing/2014/main" id="{2E93DFA1-A750-4F86-A9F1-08D455F636A0}"/>
                 </a:ext>
               </a:extLst>
             </p:cNvPr>
@@ -32318,23 +32156,23 @@
       </p:grpSp>
       <p:cxnSp>
         <p:nvCxnSpPr>
-          <p:cNvPr id="98" name="Conector de Seta Reta 97">
+          <p:cNvPr id="213" name="Conector de Seta Reta 212">
             <a:extLst>
               <a:ext uri="{FF2B5EF4-FFF2-40B4-BE49-F238E27FC236}">
-                <a16:creationId xmlns:a16="http://schemas.microsoft.com/office/drawing/2014/main" id="{1CFCD8A6-B6EF-4D3B-960F-D2E4EDBC2B35}"/>
+                <a16:creationId xmlns:a16="http://schemas.microsoft.com/office/drawing/2014/main" id="{FD21693C-6329-42C6-94C6-094A4CCF2E7E}"/>
               </a:ext>
             </a:extLst>
           </p:cNvPr>
           <p:cNvCxnSpPr>
             <a:cxnSpLocks/>
-            <a:stCxn id="139" idx="1"/>
+            <a:stCxn id="193" idx="1"/>
           </p:cNvCxnSpPr>
           <p:nvPr/>
         </p:nvCxnSpPr>
         <p:spPr>
           <a:xfrm flipH="1" flipV="1">
-            <a:off x="10640588" y="2718290"/>
-            <a:ext cx="1467362" cy="967837"/>
+            <a:off x="9825884" y="2781321"/>
+            <a:ext cx="1440774" cy="1507542"/>
           </a:xfrm>
           <a:prstGeom prst="straightConnector1">
             <a:avLst/>
@@ -32367,10 +32205,10 @@
       </p:cxnSp>
       <p:cxnSp>
         <p:nvCxnSpPr>
-          <p:cNvPr id="99" name="Conector de Seta Reta 98">
+          <p:cNvPr id="214" name="Conector de Seta Reta 213">
             <a:extLst>
               <a:ext uri="{FF2B5EF4-FFF2-40B4-BE49-F238E27FC236}">
-                <a16:creationId xmlns:a16="http://schemas.microsoft.com/office/drawing/2014/main" id="{DACCA326-C103-49C1-B297-BBCD4D656CF9}"/>
+                <a16:creationId xmlns:a16="http://schemas.microsoft.com/office/drawing/2014/main" id="{064E66D3-02C8-42DC-B3AA-4E00021524C0}"/>
               </a:ext>
             </a:extLst>
           </p:cNvPr>
@@ -32381,7 +32219,7 @@
         </p:nvCxnSpPr>
         <p:spPr>
           <a:xfrm flipH="1" flipV="1">
-            <a:off x="8047983" y="2522269"/>
+            <a:off x="7233279" y="2585298"/>
             <a:ext cx="4076216" cy="1205786"/>
           </a:xfrm>
           <a:prstGeom prst="straightConnector1">
@@ -32415,10 +32253,10 @@
       </p:cxnSp>
       <p:cxnSp>
         <p:nvCxnSpPr>
-          <p:cNvPr id="102" name="Conector de Seta Reta 101">
+          <p:cNvPr id="215" name="Conector de Seta Reta 214">
             <a:extLst>
               <a:ext uri="{FF2B5EF4-FFF2-40B4-BE49-F238E27FC236}">
-                <a16:creationId xmlns:a16="http://schemas.microsoft.com/office/drawing/2014/main" id="{CFAFE721-051C-42A0-A327-52EA51C34560}"/>
+                <a16:creationId xmlns:a16="http://schemas.microsoft.com/office/drawing/2014/main" id="{A7397454-859B-4614-930B-BF33BC0E3245}"/>
               </a:ext>
             </a:extLst>
           </p:cNvPr>
@@ -32429,7 +32267,7 @@
         </p:nvCxnSpPr>
         <p:spPr>
           <a:xfrm flipH="1" flipV="1">
-            <a:off x="5571271" y="2492461"/>
+            <a:off x="4756567" y="2555490"/>
             <a:ext cx="6552928" cy="1235594"/>
           </a:xfrm>
           <a:prstGeom prst="straightConnector1">
@@ -32463,10 +32301,10 @@
       </p:cxnSp>
       <p:cxnSp>
         <p:nvCxnSpPr>
-          <p:cNvPr id="103" name="Conector de Seta Reta 102">
+          <p:cNvPr id="216" name="Conector de Seta Reta 215">
             <a:extLst>
               <a:ext uri="{FF2B5EF4-FFF2-40B4-BE49-F238E27FC236}">
-                <a16:creationId xmlns:a16="http://schemas.microsoft.com/office/drawing/2014/main" id="{29A4F9D9-00E3-4D04-99D6-8F4FFFCCD292}"/>
+                <a16:creationId xmlns:a16="http://schemas.microsoft.com/office/drawing/2014/main" id="{7AA6091A-DFC8-4688-B7E4-1C375B208D87}"/>
               </a:ext>
             </a:extLst>
           </p:cNvPr>
@@ -32477,7 +32315,7 @@
         </p:nvCxnSpPr>
         <p:spPr>
           <a:xfrm flipH="1">
-            <a:off x="11539569" y="3728055"/>
+            <a:off x="10724865" y="3791084"/>
             <a:ext cx="584629" cy="1490924"/>
           </a:xfrm>
           <a:prstGeom prst="straightConnector1">
@@ -32511,10 +32349,10 @@
       </p:cxnSp>
       <p:cxnSp>
         <p:nvCxnSpPr>
-          <p:cNvPr id="104" name="Conector de Seta Reta 103">
+          <p:cNvPr id="217" name="Conector de Seta Reta 216">
             <a:extLst>
               <a:ext uri="{FF2B5EF4-FFF2-40B4-BE49-F238E27FC236}">
-                <a16:creationId xmlns:a16="http://schemas.microsoft.com/office/drawing/2014/main" id="{B2A85DDE-3BFC-4986-B4E5-E926971B3F1C}"/>
+                <a16:creationId xmlns:a16="http://schemas.microsoft.com/office/drawing/2014/main" id="{D4ECC1D1-25AC-4F1A-87B6-CDBA621AACB2}"/>
               </a:ext>
             </a:extLst>
           </p:cNvPr>
@@ -32525,7 +32363,7 @@
         </p:nvCxnSpPr>
         <p:spPr>
           <a:xfrm flipH="1">
-            <a:off x="9470641" y="3728055"/>
+            <a:off x="8655937" y="3791084"/>
             <a:ext cx="2653557" cy="1444752"/>
           </a:xfrm>
           <a:prstGeom prst="straightConnector1">
@@ -32559,10 +32397,10 @@
       </p:cxnSp>
       <p:cxnSp>
         <p:nvCxnSpPr>
-          <p:cNvPr id="105" name="Conector de Seta Reta 104">
+          <p:cNvPr id="218" name="Conector de Seta Reta 217">
             <a:extLst>
               <a:ext uri="{FF2B5EF4-FFF2-40B4-BE49-F238E27FC236}">
-                <a16:creationId xmlns:a16="http://schemas.microsoft.com/office/drawing/2014/main" id="{4C47CA42-8326-49A6-94FF-2F2B82FDF700}"/>
+                <a16:creationId xmlns:a16="http://schemas.microsoft.com/office/drawing/2014/main" id="{C61C3ABF-821D-4647-ABCD-FB5A48DE4D08}"/>
               </a:ext>
             </a:extLst>
           </p:cNvPr>
@@ -32573,7 +32411,7 @@
         </p:nvCxnSpPr>
         <p:spPr>
           <a:xfrm flipH="1">
-            <a:off x="7211798" y="3728055"/>
+            <a:off x="6397094" y="3791084"/>
             <a:ext cx="4912400" cy="1501010"/>
           </a:xfrm>
           <a:prstGeom prst="straightConnector1">
@@ -32607,10 +32445,10 @@
       </p:cxnSp>
       <p:cxnSp>
         <p:nvCxnSpPr>
-          <p:cNvPr id="106" name="Conector de Seta Reta 105">
+          <p:cNvPr id="219" name="Conector de Seta Reta 218">
             <a:extLst>
               <a:ext uri="{FF2B5EF4-FFF2-40B4-BE49-F238E27FC236}">
-                <a16:creationId xmlns:a16="http://schemas.microsoft.com/office/drawing/2014/main" id="{948908D0-1F17-475B-B27D-ECEDBD1307BF}"/>
+                <a16:creationId xmlns:a16="http://schemas.microsoft.com/office/drawing/2014/main" id="{2A2D663B-8060-497E-BA59-E5026F71C244}"/>
               </a:ext>
             </a:extLst>
           </p:cNvPr>
@@ -32621,7 +32459,7 @@
         </p:nvCxnSpPr>
         <p:spPr>
           <a:xfrm flipH="1">
-            <a:off x="4907996" y="3728055"/>
+            <a:off x="4093292" y="3791084"/>
             <a:ext cx="7216202" cy="1490924"/>
           </a:xfrm>
           <a:prstGeom prst="straightConnector1">
@@ -32655,23 +32493,23 @@
       </p:cxnSp>
       <p:cxnSp>
         <p:nvCxnSpPr>
-          <p:cNvPr id="107" name="Conector de Seta Reta 106">
+          <p:cNvPr id="220" name="Conector de Seta Reta 219">
             <a:extLst>
               <a:ext uri="{FF2B5EF4-FFF2-40B4-BE49-F238E27FC236}">
-                <a16:creationId xmlns:a16="http://schemas.microsoft.com/office/drawing/2014/main" id="{6DF403C2-CDDE-4BDC-B229-B91FC0A3B8FB}"/>
+                <a16:creationId xmlns:a16="http://schemas.microsoft.com/office/drawing/2014/main" id="{0C1A27D9-6B1C-4ADD-A470-529D35F6F84E}"/>
               </a:ext>
             </a:extLst>
           </p:cNvPr>
           <p:cNvCxnSpPr>
             <a:cxnSpLocks/>
-            <a:stCxn id="90" idx="2"/>
-            <a:endCxn id="62" idx="0"/>
+            <a:stCxn id="182" idx="2"/>
+            <a:endCxn id="176" idx="0"/>
           </p:cNvCxnSpPr>
           <p:nvPr/>
         </p:nvCxnSpPr>
         <p:spPr>
           <a:xfrm flipH="1">
-            <a:off x="3903573" y="2484487"/>
+            <a:off x="3088869" y="2547516"/>
             <a:ext cx="725396" cy="741456"/>
           </a:xfrm>
           <a:prstGeom prst="straightConnector1">
@@ -32699,23 +32537,23 @@
       </p:cxnSp>
       <p:cxnSp>
         <p:nvCxnSpPr>
-          <p:cNvPr id="110" name="Conector de Seta Reta 109">
+          <p:cNvPr id="221" name="Conector de Seta Reta 220">
             <a:extLst>
               <a:ext uri="{FF2B5EF4-FFF2-40B4-BE49-F238E27FC236}">
-                <a16:creationId xmlns:a16="http://schemas.microsoft.com/office/drawing/2014/main" id="{1B2D6135-1ED2-4E52-B70F-DB24D27874FE}"/>
+                <a16:creationId xmlns:a16="http://schemas.microsoft.com/office/drawing/2014/main" id="{8D1BA651-FF61-4642-9BC7-8FE8E2CE4E31}"/>
               </a:ext>
             </a:extLst>
           </p:cNvPr>
           <p:cNvCxnSpPr>
             <a:cxnSpLocks/>
-            <a:stCxn id="84" idx="2"/>
-            <a:endCxn id="62" idx="3"/>
+            <a:stCxn id="178" idx="2"/>
+            <a:endCxn id="176" idx="3"/>
           </p:cNvCxnSpPr>
           <p:nvPr/>
         </p:nvCxnSpPr>
         <p:spPr>
           <a:xfrm flipH="1">
-            <a:off x="4956568" y="2499957"/>
+            <a:off x="4141864" y="2562986"/>
             <a:ext cx="2118742" cy="1018374"/>
           </a:xfrm>
           <a:prstGeom prst="straightConnector1">
@@ -32743,22 +32581,22 @@
       </p:cxnSp>
       <p:cxnSp>
         <p:nvCxnSpPr>
-          <p:cNvPr id="111" name="Conector de Seta Reta 110">
+          <p:cNvPr id="222" name="Conector de Seta Reta 221">
             <a:extLst>
               <a:ext uri="{FF2B5EF4-FFF2-40B4-BE49-F238E27FC236}">
-                <a16:creationId xmlns:a16="http://schemas.microsoft.com/office/drawing/2014/main" id="{D033D176-3082-4308-B704-6EE4C3F7F274}"/>
+                <a16:creationId xmlns:a16="http://schemas.microsoft.com/office/drawing/2014/main" id="{974F4422-A8B3-4490-BD32-0FE21EA7FA1A}"/>
               </a:ext>
             </a:extLst>
           </p:cNvPr>
           <p:cNvCxnSpPr>
             <a:cxnSpLocks/>
-            <a:stCxn id="119" idx="2"/>
+            <a:stCxn id="186" idx="2"/>
           </p:cNvCxnSpPr>
           <p:nvPr/>
         </p:nvCxnSpPr>
         <p:spPr>
           <a:xfrm flipH="1">
-            <a:off x="4972711" y="2718290"/>
+            <a:off x="4158007" y="2781319"/>
             <a:ext cx="4695204" cy="1069938"/>
           </a:xfrm>
           <a:prstGeom prst="straightConnector1">
@@ -32786,23 +32624,23 @@
       </p:cxnSp>
       <p:cxnSp>
         <p:nvCxnSpPr>
-          <p:cNvPr id="113" name="Conector de Seta Reta 112">
+          <p:cNvPr id="223" name="Conector de Seta Reta 222">
             <a:extLst>
               <a:ext uri="{FF2B5EF4-FFF2-40B4-BE49-F238E27FC236}">
-                <a16:creationId xmlns:a16="http://schemas.microsoft.com/office/drawing/2014/main" id="{53B47C68-05B8-4142-86B9-FB61EADB6415}"/>
+                <a16:creationId xmlns:a16="http://schemas.microsoft.com/office/drawing/2014/main" id="{37051FF9-2F1A-412F-A23E-2343C7E83565}"/>
               </a:ext>
             </a:extLst>
           </p:cNvPr>
           <p:cNvCxnSpPr>
             <a:cxnSpLocks/>
-            <a:stCxn id="95" idx="0"/>
-            <a:endCxn id="58" idx="3"/>
+            <a:stCxn id="210" idx="0"/>
+            <a:endCxn id="174" idx="3"/>
           </p:cNvCxnSpPr>
           <p:nvPr/>
         </p:nvCxnSpPr>
         <p:spPr>
           <a:xfrm flipH="1" flipV="1">
-            <a:off x="4961317" y="3951473"/>
+            <a:off x="4146613" y="4014502"/>
             <a:ext cx="5636847" cy="1289820"/>
           </a:xfrm>
           <a:prstGeom prst="straightConnector1">
@@ -32830,10 +32668,10 @@
       </p:cxnSp>
       <p:cxnSp>
         <p:nvCxnSpPr>
-          <p:cNvPr id="116" name="Conector de Seta Reta 115">
+          <p:cNvPr id="224" name="Conector de Seta Reta 223">
             <a:extLst>
               <a:ext uri="{FF2B5EF4-FFF2-40B4-BE49-F238E27FC236}">
-                <a16:creationId xmlns:a16="http://schemas.microsoft.com/office/drawing/2014/main" id="{DFCCC474-64AD-4BB0-9AE3-D9D4D4C79BA3}"/>
+                <a16:creationId xmlns:a16="http://schemas.microsoft.com/office/drawing/2014/main" id="{79FE2ED6-C740-4208-99A9-A188C449850D}"/>
               </a:ext>
             </a:extLst>
           </p:cNvPr>
@@ -32844,7 +32682,7 @@
         </p:nvCxnSpPr>
         <p:spPr>
           <a:xfrm flipH="1" flipV="1">
-            <a:off x="4918905" y="4150161"/>
+            <a:off x="4104201" y="4213190"/>
             <a:ext cx="3112646" cy="1058844"/>
           </a:xfrm>
           <a:prstGeom prst="straightConnector1">
@@ -32872,22 +32710,22 @@
       </p:cxnSp>
       <p:cxnSp>
         <p:nvCxnSpPr>
-          <p:cNvPr id="122" name="Conector de Seta Reta 121">
+          <p:cNvPr id="225" name="Conector de Seta Reta 224">
             <a:extLst>
               <a:ext uri="{FF2B5EF4-FFF2-40B4-BE49-F238E27FC236}">
-                <a16:creationId xmlns:a16="http://schemas.microsoft.com/office/drawing/2014/main" id="{7E250BFD-3FB7-4CA0-8739-D4725FD8C646}"/>
+                <a16:creationId xmlns:a16="http://schemas.microsoft.com/office/drawing/2014/main" id="{09638AEC-7A9E-402B-89E4-2B28FCE6C2A3}"/>
               </a:ext>
             </a:extLst>
           </p:cNvPr>
           <p:cNvCxnSpPr>
             <a:cxnSpLocks/>
-            <a:stCxn id="78" idx="0"/>
+            <a:stCxn id="202" idx="0"/>
           </p:cNvCxnSpPr>
           <p:nvPr/>
         </p:nvCxnSpPr>
         <p:spPr>
           <a:xfrm flipH="1" flipV="1">
-            <a:off x="4473454" y="4646691"/>
+            <a:off x="3658750" y="4709720"/>
             <a:ext cx="1739038" cy="601878"/>
           </a:xfrm>
           <a:prstGeom prst="straightConnector1">
@@ -32915,22 +32753,22 @@
       </p:cxnSp>
       <p:cxnSp>
         <p:nvCxnSpPr>
-          <p:cNvPr id="123" name="Conector de Seta Reta 122">
+          <p:cNvPr id="226" name="Conector de Seta Reta 225">
             <a:extLst>
               <a:ext uri="{FF2B5EF4-FFF2-40B4-BE49-F238E27FC236}">
-                <a16:creationId xmlns:a16="http://schemas.microsoft.com/office/drawing/2014/main" id="{70216789-0F92-426B-9E96-6E691CB5C704}"/>
+                <a16:creationId xmlns:a16="http://schemas.microsoft.com/office/drawing/2014/main" id="{95CB409E-D32F-4561-93FC-28AC47BFE9EF}"/>
               </a:ext>
             </a:extLst>
           </p:cNvPr>
           <p:cNvCxnSpPr>
             <a:cxnSpLocks/>
-            <a:stCxn id="65" idx="0"/>
+            <a:stCxn id="199" idx="0"/>
           </p:cNvCxnSpPr>
           <p:nvPr/>
         </p:nvCxnSpPr>
         <p:spPr>
           <a:xfrm flipH="1" flipV="1">
-            <a:off x="3818557" y="4678803"/>
+            <a:off x="3003853" y="4741832"/>
             <a:ext cx="143072" cy="618970"/>
           </a:xfrm>
           <a:prstGeom prst="straightConnector1">
@@ -32950,6 +32788,54 @@
           </a:fillRef>
           <a:effectRef idx="0">
             <a:schemeClr val="dk1"/>
+          </a:effectRef>
+          <a:fontRef idx="minor">
+            <a:schemeClr val="tx1"/>
+          </a:fontRef>
+        </p:style>
+      </p:cxnSp>
+      <p:cxnSp>
+        <p:nvCxnSpPr>
+          <p:cNvPr id="227" name="Conector de Seta Reta 226">
+            <a:extLst>
+              <a:ext uri="{FF2B5EF4-FFF2-40B4-BE49-F238E27FC236}">
+                <a16:creationId xmlns:a16="http://schemas.microsoft.com/office/drawing/2014/main" id="{0AB8534E-1F33-43E9-8A73-83AFCB520A2E}"/>
+              </a:ext>
+            </a:extLst>
+          </p:cNvPr>
+          <p:cNvCxnSpPr>
+            <a:cxnSpLocks/>
+          </p:cNvCxnSpPr>
+          <p:nvPr/>
+        </p:nvCxnSpPr>
+        <p:spPr>
+          <a:xfrm flipH="1" flipV="1">
+            <a:off x="1312266" y="3404803"/>
+            <a:ext cx="770296" cy="578242"/>
+          </a:xfrm>
+          <a:prstGeom prst="straightConnector1">
+            <a:avLst/>
+          </a:prstGeom>
+          <a:ln w="19050">
+            <a:solidFill>
+              <a:schemeClr val="accent5">
+                <a:lumMod val="75000"/>
+              </a:schemeClr>
+            </a:solidFill>
+            <a:prstDash val="sysDash"/>
+            <a:headEnd type="none" w="lg" len="lg"/>
+            <a:tailEnd type="triangle" w="lg" len="lg"/>
+          </a:ln>
+        </p:spPr>
+        <p:style>
+          <a:lnRef idx="1">
+            <a:schemeClr val="accent1"/>
+          </a:lnRef>
+          <a:fillRef idx="0">
+            <a:schemeClr val="accent1"/>
+          </a:fillRef>
+          <a:effectRef idx="0">
+            <a:schemeClr val="accent1"/>
           </a:effectRef>
           <a:fontRef idx="minor">
             <a:schemeClr val="tx1"/>
@@ -33000,7 +32886,7 @@
                                           </p:stCondLst>
                                         </p:cTn>
                                         <p:tgtEl>
-                                          <p:spTgt spid="118"/>
+                                          <p:spTgt spid="185"/>
                                         </p:tgtEl>
                                         <p:attrNameLst>
                                           <p:attrName>style.visibility</p:attrName>
@@ -33045,7 +32931,7 @@
                                           </p:stCondLst>
                                         </p:cTn>
                                         <p:tgtEl>
-                                          <p:spTgt spid="83"/>
+                                          <p:spTgt spid="177"/>
                                         </p:tgtEl>
                                         <p:attrNameLst>
                                           <p:attrName>style.visibility</p:attrName>
@@ -33072,7 +32958,7 @@
                                           </p:stCondLst>
                                         </p:cTn>
                                         <p:tgtEl>
-                                          <p:spTgt spid="57"/>
+                                          <p:spTgt spid="173"/>
                                         </p:tgtEl>
                                         <p:attrNameLst>
                                           <p:attrName>style.visibility</p:attrName>
@@ -33117,7 +33003,7 @@
                                           </p:stCondLst>
                                         </p:cTn>
                                         <p:tgtEl>
-                                          <p:spTgt spid="89"/>
+                                          <p:spTgt spid="181"/>
                                         </p:tgtEl>
                                         <p:attrNameLst>
                                           <p:attrName>style.visibility</p:attrName>
@@ -33162,7 +33048,7 @@
                                           </p:stCondLst>
                                         </p:cTn>
                                         <p:tgtEl>
-                                          <p:spTgt spid="108"/>
+                                          <p:spTgt spid="197"/>
                                         </p:tgtEl>
                                         <p:attrNameLst>
                                           <p:attrName>style.visibility</p:attrName>
@@ -33207,7 +33093,7 @@
                                           </p:stCondLst>
                                         </p:cTn>
                                         <p:tgtEl>
-                                          <p:spTgt spid="63"/>
+                                          <p:spTgt spid="201"/>
                                         </p:tgtEl>
                                         <p:attrNameLst>
                                           <p:attrName>style.visibility</p:attrName>
@@ -33252,7 +33138,7 @@
                                           </p:stCondLst>
                                         </p:cTn>
                                         <p:tgtEl>
-                                          <p:spTgt spid="77"/>
+                                          <p:spTgt spid="205"/>
                                         </p:tgtEl>
                                         <p:attrNameLst>
                                           <p:attrName>style.visibility</p:attrName>
@@ -33297,7 +33183,7 @@
                                           </p:stCondLst>
                                         </p:cTn>
                                         <p:tgtEl>
-                                          <p:spTgt spid="81"/>
+                                          <p:spTgt spid="209"/>
                                         </p:tgtEl>
                                         <p:attrNameLst>
                                           <p:attrName>style.visibility</p:attrName>
@@ -33342,7 +33228,7 @@
                                           </p:stCondLst>
                                         </p:cTn>
                                         <p:tgtEl>
-                                          <p:spTgt spid="94"/>
+                                          <p:spTgt spid="213"/>
                                         </p:tgtEl>
                                         <p:attrNameLst>
                                           <p:attrName>style.visibility</p:attrName>
@@ -33387,7 +33273,7 @@
                                           </p:stCondLst>
                                         </p:cTn>
                                         <p:tgtEl>
-                                          <p:spTgt spid="98"/>
+                                          <p:spTgt spid="214"/>
                                         </p:tgtEl>
                                         <p:attrNameLst>
                                           <p:attrName>style.visibility</p:attrName>
@@ -33432,7 +33318,7 @@
                                           </p:stCondLst>
                                         </p:cTn>
                                         <p:tgtEl>
-                                          <p:spTgt spid="99"/>
+                                          <p:spTgt spid="215"/>
                                         </p:tgtEl>
                                         <p:attrNameLst>
                                           <p:attrName>style.visibility</p:attrName>
@@ -33477,7 +33363,7 @@
                                           </p:stCondLst>
                                         </p:cTn>
                                         <p:tgtEl>
-                                          <p:spTgt spid="102"/>
+                                          <p:spTgt spid="216"/>
                                         </p:tgtEl>
                                         <p:attrNameLst>
                                           <p:attrName>style.visibility</p:attrName>
@@ -33522,7 +33408,7 @@
                                           </p:stCondLst>
                                         </p:cTn>
                                         <p:tgtEl>
-                                          <p:spTgt spid="103"/>
+                                          <p:spTgt spid="217"/>
                                         </p:tgtEl>
                                         <p:attrNameLst>
                                           <p:attrName>style.visibility</p:attrName>
@@ -33567,7 +33453,7 @@
                                           </p:stCondLst>
                                         </p:cTn>
                                         <p:tgtEl>
-                                          <p:spTgt spid="104"/>
+                                          <p:spTgt spid="218"/>
                                         </p:tgtEl>
                                         <p:attrNameLst>
                                           <p:attrName>style.visibility</p:attrName>
@@ -33612,7 +33498,7 @@
                                           </p:stCondLst>
                                         </p:cTn>
                                         <p:tgtEl>
-                                          <p:spTgt spid="105"/>
+                                          <p:spTgt spid="219"/>
                                         </p:tgtEl>
                                         <p:attrNameLst>
                                           <p:attrName>style.visibility</p:attrName>
@@ -33657,7 +33543,7 @@
                                           </p:stCondLst>
                                         </p:cTn>
                                         <p:tgtEl>
-                                          <p:spTgt spid="106"/>
+                                          <p:spTgt spid="220"/>
                                         </p:tgtEl>
                                         <p:attrNameLst>
                                           <p:attrName>style.visibility</p:attrName>
@@ -33702,7 +33588,7 @@
                                           </p:stCondLst>
                                         </p:cTn>
                                         <p:tgtEl>
-                                          <p:spTgt spid="107"/>
+                                          <p:spTgt spid="221"/>
                                         </p:tgtEl>
                                         <p:attrNameLst>
                                           <p:attrName>style.visibility</p:attrName>
@@ -33747,7 +33633,7 @@
                                           </p:stCondLst>
                                         </p:cTn>
                                         <p:tgtEl>
-                                          <p:spTgt spid="110"/>
+                                          <p:spTgt spid="222"/>
                                         </p:tgtEl>
                                         <p:attrNameLst>
                                           <p:attrName>style.visibility</p:attrName>
@@ -33792,7 +33678,7 @@
                                           </p:stCondLst>
                                         </p:cTn>
                                         <p:tgtEl>
-                                          <p:spTgt spid="111"/>
+                                          <p:spTgt spid="223"/>
                                         </p:tgtEl>
                                         <p:attrNameLst>
                                           <p:attrName>style.visibility</p:attrName>
@@ -33837,7 +33723,7 @@
                                           </p:stCondLst>
                                         </p:cTn>
                                         <p:tgtEl>
-                                          <p:spTgt spid="113"/>
+                                          <p:spTgt spid="224"/>
                                         </p:tgtEl>
                                         <p:attrNameLst>
                                           <p:attrName>style.visibility</p:attrName>
@@ -33882,7 +33768,7 @@
                                           </p:stCondLst>
                                         </p:cTn>
                                         <p:tgtEl>
-                                          <p:spTgt spid="116"/>
+                                          <p:spTgt spid="225"/>
                                         </p:tgtEl>
                                         <p:attrNameLst>
                                           <p:attrName>style.visibility</p:attrName>
@@ -33927,7 +33813,7 @@
                                           </p:stCondLst>
                                         </p:cTn>
                                         <p:tgtEl>
-                                          <p:spTgt spid="122"/>
+                                          <p:spTgt spid="226"/>
                                         </p:tgtEl>
                                         <p:attrNameLst>
                                           <p:attrName>style.visibility</p:attrName>
@@ -33972,7 +33858,7 @@
                                           </p:stCondLst>
                                         </p:cTn>
                                         <p:tgtEl>
-                                          <p:spTgt spid="123"/>
+                                          <p:spTgt spid="227"/>
                                         </p:tgtEl>
                                         <p:attrNameLst>
                                           <p:attrName>style.visibility</p:attrName>

</xml_diff>

<commit_message>
Arquitetura de Componentes e modelagem
</commit_message>
<xml_diff>
--- a/Documentação/Engenharia de Sofware - Arq Componentes.pptx
+++ b/Documentação/Engenharia de Sofware - Arq Componentes.pptx
@@ -24741,14 +24741,14 @@
           <p:nvPr>
             <p:extLst>
               <p:ext uri="{D42A27DB-BD31-4B8C-83A1-F6EECF244321}">
-                <p14:modId xmlns:p14="http://schemas.microsoft.com/office/powerpoint/2010/main" val="821348927"/>
+                <p14:modId xmlns:p14="http://schemas.microsoft.com/office/powerpoint/2010/main" val="3400142255"/>
               </p:ext>
             </p:extLst>
           </p:nvPr>
         </p:nvGraphicFramePr>
         <p:xfrm>
           <a:off x="164557" y="1546080"/>
-          <a:ext cx="3711043" cy="1771711"/>
+          <a:ext cx="3711043" cy="2985183"/>
         </p:xfrm>
         <a:graphic>
           <a:graphicData uri="http://schemas.openxmlformats.org/drawingml/2006/table">
@@ -24765,7 +24765,7 @@
                   </a:extLst>
                 </a:gridCol>
               </a:tblGrid>
-              <a:tr h="499488">
+              <a:tr h="966207">
                 <a:tc>
                   <a:txBody>
                     <a:bodyPr/>
@@ -24831,7 +24831,7 @@
                   </a:ext>
                 </a:extLst>
               </a:tr>
-              <a:tr h="368289">
+              <a:tr h="555936">
                 <a:tc>
                   <a:txBody>
                     <a:bodyPr/>
@@ -24881,7 +24881,7 @@
                   </a:ext>
                 </a:extLst>
               </a:tr>
-              <a:tr h="763342">
+              <a:tr h="1152273">
                 <a:tc>
                   <a:txBody>
                     <a:bodyPr/>
@@ -24947,6 +24947,118 @@
                         </a:rPr>
                         <a:t>): </a:t>
                       </a:r>
+                      <a:r>
+                        <a:rPr lang="pt-BR" sz="1800" dirty="0" err="1">
+                          <a:solidFill>
+                            <a:srgbClr val="FF0000"/>
+                          </a:solidFill>
+                        </a:rPr>
+                        <a:t>ResponseEntity</a:t>
+                      </a:r>
+                      <a:endParaRPr lang="pt-BR" sz="1800" dirty="0">
+                        <a:solidFill>
+                          <a:srgbClr val="FF0000"/>
+                        </a:solidFill>
+                      </a:endParaRPr>
+                    </a:p>
+                    <a:p>
+                      <a:r>
+                        <a:rPr lang="pt-BR" sz="1800" dirty="0">
+                          <a:solidFill>
+                            <a:srgbClr val="FF0000"/>
+                          </a:solidFill>
+                        </a:rPr>
+                        <a:t>+</a:t>
+                      </a:r>
+                      <a:r>
+                        <a:rPr lang="pt-BR" sz="1800" dirty="0" err="1">
+                          <a:solidFill>
+                            <a:srgbClr val="FF0000"/>
+                          </a:solidFill>
+                        </a:rPr>
+                        <a:t>getMyCurso</a:t>
+                      </a:r>
+                      <a:r>
+                        <a:rPr lang="pt-BR" sz="1800" dirty="0">
+                          <a:solidFill>
+                            <a:srgbClr val="FF0000"/>
+                          </a:solidFill>
+                        </a:rPr>
+                        <a:t>(</a:t>
+                      </a:r>
+                      <a:r>
+                        <a:rPr lang="pt-BR" sz="1800" dirty="0" err="1">
+                          <a:solidFill>
+                            <a:srgbClr val="FF0000"/>
+                          </a:solidFill>
+                        </a:rPr>
+                        <a:t>Integer</a:t>
+                      </a:r>
+                      <a:r>
+                        <a:rPr lang="pt-BR" sz="1800" dirty="0">
+                          <a:solidFill>
+                            <a:srgbClr val="FF0000"/>
+                          </a:solidFill>
+                        </a:rPr>
+                        <a:t>):</a:t>
+                      </a:r>
+                      <a:r>
+                        <a:rPr lang="pt-BR" sz="1800" dirty="0" err="1">
+                          <a:solidFill>
+                            <a:srgbClr val="FF0000"/>
+                          </a:solidFill>
+                        </a:rPr>
+                        <a:t>ResponseEntity</a:t>
+                      </a:r>
+                      <a:endParaRPr lang="pt-BR" sz="1800" dirty="0">
+                        <a:solidFill>
+                          <a:srgbClr val="FF0000"/>
+                        </a:solidFill>
+                      </a:endParaRPr>
+                    </a:p>
+                    <a:p>
+                      <a:r>
+                        <a:rPr lang="pt-BR" sz="1800" dirty="0">
+                          <a:solidFill>
+                            <a:srgbClr val="FF0000"/>
+                          </a:solidFill>
+                        </a:rPr>
+                        <a:t>+</a:t>
+                      </a:r>
+                      <a:r>
+                        <a:rPr lang="pt-BR" sz="1800" dirty="0" err="1">
+                          <a:solidFill>
+                            <a:srgbClr val="FF0000"/>
+                          </a:solidFill>
+                        </a:rPr>
+                        <a:t>getCursoFinalizados</a:t>
+                      </a:r>
+                      <a:r>
+                        <a:rPr lang="pt-BR" sz="1800" dirty="0">
+                          <a:solidFill>
+                            <a:srgbClr val="FF0000"/>
+                          </a:solidFill>
+                        </a:rPr>
+                        <a:t>(</a:t>
+                      </a:r>
+                      <a:r>
+                        <a:rPr lang="pt-BR" sz="1800" dirty="0" err="1">
+                          <a:solidFill>
+                            <a:srgbClr val="FF0000"/>
+                          </a:solidFill>
+                        </a:rPr>
+                        <a:t>Integer</a:t>
+                      </a:r>
+                      <a:r>
+                        <a:rPr lang="pt-BR" sz="1800" dirty="0">
+                          <a:solidFill>
+                            <a:srgbClr val="FF0000"/>
+                          </a:solidFill>
+                        </a:rPr>
+                        <a:t>):</a:t>
+                      </a:r>
+                    </a:p>
+                    <a:p>
                       <a:r>
                         <a:rPr lang="pt-BR" sz="1800" dirty="0" err="1">
                           <a:solidFill>
@@ -25779,14 +25891,14 @@
           <p:nvPr>
             <p:extLst>
               <p:ext uri="{D42A27DB-BD31-4B8C-83A1-F6EECF244321}">
-                <p14:modId xmlns:p14="http://schemas.microsoft.com/office/powerpoint/2010/main" val="296353434"/>
+                <p14:modId xmlns:p14="http://schemas.microsoft.com/office/powerpoint/2010/main" val="1203039520"/>
               </p:ext>
             </p:extLst>
           </p:nvPr>
         </p:nvGraphicFramePr>
         <p:xfrm>
           <a:off x="4770167" y="1856043"/>
-          <a:ext cx="3511707" cy="2674416"/>
+          <a:ext cx="3511707" cy="2536840"/>
         </p:xfrm>
         <a:graphic>
           <a:graphicData uri="http://schemas.openxmlformats.org/drawingml/2006/table">
@@ -25924,137 +26036,6 @@
                   <a:txBody>
                     <a:bodyPr/>
                     <a:lstStyle/>
-                    <a:p>
-                      <a:r>
-                        <a:rPr lang="pt-BR" sz="1800" dirty="0">
-                          <a:solidFill>
-                            <a:srgbClr val="FF0000"/>
-                          </a:solidFill>
-                        </a:rPr>
-                        <a:t>+ </a:t>
-                      </a:r>
-                      <a:r>
-                        <a:rPr lang="pt-BR" sz="1800" kern="1200" dirty="0" err="1">
-                          <a:solidFill>
-                            <a:srgbClr val="FF0000"/>
-                          </a:solidFill>
-                          <a:effectLst/>
-                          <a:latin typeface="+mn-lt"/>
-                          <a:ea typeface="+mn-ea"/>
-                          <a:cs typeface="+mn-cs"/>
-                        </a:rPr>
-                        <a:t>findByFkUsuarioAndDateGreater</a:t>
-                      </a:r>
-                      <a:endParaRPr lang="pt-BR" sz="1800" kern="1200" dirty="0">
-                        <a:solidFill>
-                          <a:srgbClr val="FF0000"/>
-                        </a:solidFill>
-                        <a:effectLst/>
-                        <a:latin typeface="+mn-lt"/>
-                        <a:ea typeface="+mn-ea"/>
-                        <a:cs typeface="+mn-cs"/>
-                      </a:endParaRPr>
-                    </a:p>
-                    <a:p>
-                      <a:r>
-                        <a:rPr lang="pt-BR" sz="1800" kern="1200" dirty="0" err="1">
-                          <a:solidFill>
-                            <a:srgbClr val="FF0000"/>
-                          </a:solidFill>
-                          <a:effectLst/>
-                          <a:latin typeface="+mn-lt"/>
-                          <a:ea typeface="+mn-ea"/>
-                          <a:cs typeface="+mn-cs"/>
-                        </a:rPr>
-                        <a:t>Than</a:t>
-                      </a:r>
-                      <a:r>
-                        <a:rPr lang="pt-BR" sz="1800" kern="1200" dirty="0">
-                          <a:solidFill>
-                            <a:srgbClr val="FF0000"/>
-                          </a:solidFill>
-                          <a:effectLst/>
-                          <a:latin typeface="+mn-lt"/>
-                          <a:ea typeface="+mn-ea"/>
-                          <a:cs typeface="+mn-cs"/>
-                        </a:rPr>
-                        <a:t> </a:t>
-                      </a:r>
-                      <a:r>
-                        <a:rPr lang="pt-BR" sz="1800" dirty="0">
-                          <a:solidFill>
-                            <a:srgbClr val="FF0000"/>
-                          </a:solidFill>
-                        </a:rPr>
-                        <a:t>(</a:t>
-                      </a:r>
-                      <a:r>
-                        <a:rPr lang="pt-BR" sz="1800" dirty="0" err="1">
-                          <a:solidFill>
-                            <a:srgbClr val="FF0000"/>
-                          </a:solidFill>
-                        </a:rPr>
-                        <a:t>Integer</a:t>
-                      </a:r>
-                      <a:r>
-                        <a:rPr lang="pt-BR" sz="1800" dirty="0">
-                          <a:solidFill>
-                            <a:srgbClr val="FF0000"/>
-                          </a:solidFill>
-                        </a:rPr>
-                        <a:t>, </a:t>
-                      </a:r>
-                      <a:r>
-                        <a:rPr lang="pt-BR" sz="1800" dirty="0" err="1">
-                          <a:solidFill>
-                            <a:srgbClr val="FF0000"/>
-                          </a:solidFill>
-                        </a:rPr>
-                        <a:t>LocalDate</a:t>
-                      </a:r>
-                      <a:r>
-                        <a:rPr lang="pt-BR" sz="1800" dirty="0">
-                          <a:solidFill>
-                            <a:srgbClr val="FF0000"/>
-                          </a:solidFill>
-                        </a:rPr>
-                        <a:t> ):</a:t>
-                      </a:r>
-                    </a:p>
-                    <a:p>
-                      <a:r>
-                        <a:rPr lang="pt-BR" sz="1800" dirty="0" err="1">
-                          <a:solidFill>
-                            <a:srgbClr val="FF0000"/>
-                          </a:solidFill>
-                        </a:rPr>
-                        <a:t>List</a:t>
-                      </a:r>
-                      <a:r>
-                        <a:rPr lang="pt-BR" sz="1800" dirty="0">
-                          <a:solidFill>
-                            <a:srgbClr val="FF0000"/>
-                          </a:solidFill>
-                        </a:rPr>
-                        <a:t>&lt;</a:t>
-                      </a:r>
-                      <a:r>
-                        <a:rPr lang="pt-BR" sz="1800" dirty="0" err="1">
-                          <a:solidFill>
-                            <a:srgbClr val="FF0000"/>
-                          </a:solidFill>
-                        </a:rPr>
-                        <a:t>UsuarioCurso</a:t>
-                      </a:r>
-                      <a:r>
-                        <a:rPr lang="pt-BR" sz="1800" dirty="0">
-                          <a:solidFill>
-                            <a:srgbClr val="FF0000"/>
-                          </a:solidFill>
-                        </a:rPr>
-                        <a:t>&gt;</a:t>
-                      </a:r>
-                    </a:p>
                     <a:p>
                       <a:endParaRPr lang="pt-BR" dirty="0"/>
                     </a:p>
@@ -26425,8 +26406,8 @@
         </p:nvCxnSpPr>
         <p:spPr>
           <a:xfrm>
-            <a:off x="3875600" y="2431935"/>
-            <a:ext cx="894567" cy="761316"/>
+            <a:off x="3875600" y="3038671"/>
+            <a:ext cx="894567" cy="85792"/>
           </a:xfrm>
           <a:prstGeom prst="straightConnector1">
             <a:avLst/>
@@ -26468,15 +26449,14 @@
           </p:cNvPr>
           <p:cNvCxnSpPr>
             <a:cxnSpLocks/>
-            <a:stCxn id="56" idx="2"/>
             <a:endCxn id="70" idx="1"/>
           </p:cNvCxnSpPr>
           <p:nvPr/>
         </p:nvCxnSpPr>
         <p:spPr>
           <a:xfrm>
-            <a:off x="2020078" y="3317791"/>
-            <a:ext cx="2955136" cy="2921532"/>
+            <a:off x="3875600" y="4794069"/>
+            <a:ext cx="1099614" cy="1445254"/>
           </a:xfrm>
           <a:prstGeom prst="straightConnector1">
             <a:avLst/>
@@ -26526,7 +26506,7 @@
         <p:spPr>
           <a:xfrm flipV="1">
             <a:off x="8281874" y="3057369"/>
-            <a:ext cx="1584086" cy="135882"/>
+            <a:ext cx="1584086" cy="67094"/>
           </a:xfrm>
           <a:prstGeom prst="straightConnector1">
             <a:avLst/>
@@ -34488,11 +34468,17 @@
           <p:cNvGraphicFramePr>
             <a:graphicFrameLocks noGrp="1"/>
           </p:cNvGraphicFramePr>
-          <p:nvPr/>
+          <p:nvPr>
+            <p:extLst>
+              <p:ext uri="{D42A27DB-BD31-4B8C-83A1-F6EECF244321}">
+                <p14:modId xmlns:p14="http://schemas.microsoft.com/office/powerpoint/2010/main" val="526424286"/>
+              </p:ext>
+            </p:extLst>
+          </p:nvPr>
         </p:nvGraphicFramePr>
         <p:xfrm>
           <a:off x="9586787" y="1045020"/>
-          <a:ext cx="3101611" cy="4663440"/>
+          <a:ext cx="3101611" cy="4937760"/>
         </p:xfrm>
         <a:graphic>
           <a:graphicData uri="http://schemas.openxmlformats.org/drawingml/2006/table">
@@ -34863,10 +34849,42 @@
                       </a:endParaRPr>
                     </a:p>
                     <a:p>
-                      <a:pPr marL="285750" indent="-285750">
+                      <a:pPr marL="0" indent="0">
                         <a:buFontTx/>
-                        <a:buChar char="-"/>
+                        <a:buNone/>
                       </a:pPr>
+                      <a:r>
+                        <a:rPr lang="pt-BR" sz="1800" dirty="0">
+                          <a:solidFill>
+                            <a:schemeClr val="tx1"/>
+                          </a:solidFill>
+                        </a:rPr>
+                        <a:t>- </a:t>
+                      </a:r>
+                      <a:r>
+                        <a:rPr lang="pt-BR" sz="1800" dirty="0" err="1">
+                          <a:solidFill>
+                            <a:schemeClr val="tx1"/>
+                          </a:solidFill>
+                        </a:rPr>
+                        <a:t>qtdPontos</a:t>
+                      </a:r>
+                      <a:r>
+                        <a:rPr lang="pt-BR" sz="1800" dirty="0">
+                          <a:solidFill>
+                            <a:schemeClr val="tx1"/>
+                          </a:solidFill>
+                        </a:rPr>
+                        <a:t> : </a:t>
+                      </a:r>
+                      <a:r>
+                        <a:rPr lang="pt-BR" sz="1800" dirty="0" err="1">
+                          <a:solidFill>
+                            <a:schemeClr val="tx1"/>
+                          </a:solidFill>
+                        </a:rPr>
+                        <a:t>Integer</a:t>
+                      </a:r>
                       <a:endParaRPr lang="pt-BR" sz="1800" dirty="0">
                         <a:solidFill>
                           <a:schemeClr val="tx1"/>
@@ -35243,6 +35261,62 @@
                           </a:solidFill>
                         </a:rPr>
                         <a:t>String</a:t>
+                      </a:r>
+                      <a:endParaRPr lang="pt-BR" sz="1800" dirty="0">
+                        <a:solidFill>
+                          <a:srgbClr val="E6005A"/>
+                        </a:solidFill>
+                      </a:endParaRPr>
+                    </a:p>
+                    <a:p>
+                      <a:pPr marL="0" marR="0" lvl="0" indent="0" algn="l" defTabSz="1149545" rtl="0" eaLnBrk="1" fontAlgn="auto" latinLnBrk="0" hangingPunct="1">
+                        <a:lnSpc>
+                          <a:spcPct val="100000"/>
+                        </a:lnSpc>
+                        <a:spcBef>
+                          <a:spcPts val="0"/>
+                        </a:spcBef>
+                        <a:spcAft>
+                          <a:spcPts val="0"/>
+                        </a:spcAft>
+                        <a:buClrTx/>
+                        <a:buSzTx/>
+                        <a:buFontTx/>
+                        <a:buNone/>
+                        <a:tabLst/>
+                        <a:defRPr/>
+                      </a:pPr>
+                      <a:r>
+                        <a:rPr lang="pt-BR" sz="1800" dirty="0">
+                          <a:solidFill>
+                            <a:srgbClr val="E6005A"/>
+                          </a:solidFill>
+                        </a:rPr>
+                        <a:t>+ </a:t>
+                      </a:r>
+                      <a:r>
+                        <a:rPr lang="pt-BR" sz="1800" dirty="0" err="1">
+                          <a:solidFill>
+                            <a:srgbClr val="E6005A"/>
+                          </a:solidFill>
+                        </a:rPr>
+                        <a:t>getQtdPontos</a:t>
+                      </a:r>
+                      <a:r>
+                        <a:rPr lang="pt-BR" sz="1800" dirty="0">
+                          <a:solidFill>
+                            <a:srgbClr val="E6005A"/>
+                          </a:solidFill>
+                        </a:rPr>
+                        <a:t>():</a:t>
+                      </a:r>
+                      <a:r>
+                        <a:rPr lang="pt-BR" sz="1800" dirty="0" err="1">
+                          <a:solidFill>
+                            <a:srgbClr val="E6005A"/>
+                          </a:solidFill>
+                        </a:rPr>
+                        <a:t>Integer</a:t>
                       </a:r>
                       <a:endParaRPr lang="pt-BR" sz="1800" dirty="0">
                         <a:solidFill>
@@ -36138,7 +36212,7 @@
         <p:spPr>
           <a:xfrm>
             <a:off x="8281874" y="2809266"/>
-            <a:ext cx="1304913" cy="567474"/>
+            <a:ext cx="1304913" cy="704634"/>
           </a:xfrm>
           <a:prstGeom prst="straightConnector1">
             <a:avLst/>
@@ -36187,8 +36261,8 @@
         </p:nvCxnSpPr>
         <p:spPr>
           <a:xfrm flipV="1">
-            <a:off x="8076825" y="5708460"/>
-            <a:ext cx="3060767" cy="530863"/>
+            <a:off x="8076825" y="5982780"/>
+            <a:ext cx="3060767" cy="256543"/>
           </a:xfrm>
           <a:prstGeom prst="straightConnector1">
             <a:avLst/>
@@ -42294,7 +42368,7 @@
           <p:nvPr>
             <p:extLst>
               <p:ext uri="{D42A27DB-BD31-4B8C-83A1-F6EECF244321}">
-                <p14:modId xmlns:p14="http://schemas.microsoft.com/office/powerpoint/2010/main" val="4159952034"/>
+                <p14:modId xmlns:p14="http://schemas.microsoft.com/office/powerpoint/2010/main" val="3157713527"/>
               </p:ext>
             </p:extLst>
           </p:nvPr>
@@ -42458,7 +42532,7 @@
                           <a:ea typeface="+mn-ea"/>
                           <a:cs typeface="+mn-cs"/>
                         </a:rPr>
-                        <a:t>getUsuarios</a:t>
+                        <a:t>getUsuario</a:t>
                       </a:r>
                       <a:r>
                         <a:rPr lang="pt-BR" sz="1800" dirty="0">
@@ -42760,14 +42834,14 @@
           <p:nvPr>
             <p:extLst>
               <p:ext uri="{D42A27DB-BD31-4B8C-83A1-F6EECF244321}">
-                <p14:modId xmlns:p14="http://schemas.microsoft.com/office/powerpoint/2010/main" val="1539443991"/>
+                <p14:modId xmlns:p14="http://schemas.microsoft.com/office/powerpoint/2010/main" val="950168766"/>
               </p:ext>
             </p:extLst>
           </p:nvPr>
         </p:nvGraphicFramePr>
         <p:xfrm>
           <a:off x="9865960" y="999969"/>
-          <a:ext cx="3101611" cy="6035040"/>
+          <a:ext cx="3101611" cy="6583680"/>
         </p:xfrm>
         <a:graphic>
           <a:graphicData uri="http://schemas.openxmlformats.org/drawingml/2006/table">
@@ -43147,6 +43221,62 @@
                           </a:solidFill>
                         </a:rPr>
                         <a:t>String</a:t>
+                      </a:r>
+                      <a:endParaRPr lang="pt-BR" sz="1800" dirty="0">
+                        <a:solidFill>
+                          <a:schemeClr val="tx1"/>
+                        </a:solidFill>
+                      </a:endParaRPr>
+                    </a:p>
+                    <a:p>
+                      <a:pPr marL="0" marR="0" lvl="0" indent="0" algn="l" defTabSz="1149545" rtl="0" eaLnBrk="1" fontAlgn="auto" latinLnBrk="0" hangingPunct="1">
+                        <a:lnSpc>
+                          <a:spcPct val="100000"/>
+                        </a:lnSpc>
+                        <a:spcBef>
+                          <a:spcPts val="0"/>
+                        </a:spcBef>
+                        <a:spcAft>
+                          <a:spcPts val="0"/>
+                        </a:spcAft>
+                        <a:buClrTx/>
+                        <a:buSzTx/>
+                        <a:buFontTx/>
+                        <a:buNone/>
+                        <a:tabLst/>
+                        <a:defRPr/>
+                      </a:pPr>
+                      <a:r>
+                        <a:rPr lang="pt-BR" sz="1800" dirty="0">
+                          <a:solidFill>
+                            <a:schemeClr val="tx1"/>
+                          </a:solidFill>
+                        </a:rPr>
+                        <a:t>- </a:t>
+                      </a:r>
+                      <a:r>
+                        <a:rPr lang="pt-BR" sz="1800" dirty="0" err="1">
+                          <a:solidFill>
+                            <a:schemeClr val="tx1"/>
+                          </a:solidFill>
+                        </a:rPr>
+                        <a:t>horaCadastro</a:t>
+                      </a:r>
+                      <a:r>
+                        <a:rPr lang="pt-BR" sz="1800" dirty="0">
+                          <a:solidFill>
+                            <a:schemeClr val="tx1"/>
+                          </a:solidFill>
+                        </a:rPr>
+                        <a:t> : </a:t>
+                      </a:r>
+                      <a:r>
+                        <a:rPr lang="pt-BR" sz="1800" dirty="0" err="1">
+                          <a:solidFill>
+                            <a:schemeClr val="tx1"/>
+                          </a:solidFill>
+                        </a:rPr>
+                        <a:t>LocalDate</a:t>
                       </a:r>
                       <a:endParaRPr lang="pt-BR" sz="1800" dirty="0">
                         <a:solidFill>
@@ -43620,6 +43750,62 @@
                           </a:solidFill>
                         </a:rPr>
                         <a:t>String</a:t>
+                      </a:r>
+                      <a:endParaRPr lang="pt-BR" sz="1800" dirty="0">
+                        <a:solidFill>
+                          <a:srgbClr val="E6005A"/>
+                        </a:solidFill>
+                      </a:endParaRPr>
+                    </a:p>
+                    <a:p>
+                      <a:pPr marL="0" marR="0" lvl="0" indent="0" algn="l" defTabSz="1149545" rtl="0" eaLnBrk="1" fontAlgn="auto" latinLnBrk="0" hangingPunct="1">
+                        <a:lnSpc>
+                          <a:spcPct val="100000"/>
+                        </a:lnSpc>
+                        <a:spcBef>
+                          <a:spcPts val="0"/>
+                        </a:spcBef>
+                        <a:spcAft>
+                          <a:spcPts val="0"/>
+                        </a:spcAft>
+                        <a:buClrTx/>
+                        <a:buSzTx/>
+                        <a:buFontTx/>
+                        <a:buNone/>
+                        <a:tabLst/>
+                        <a:defRPr/>
+                      </a:pPr>
+                      <a:r>
+                        <a:rPr lang="pt-BR" sz="1800" dirty="0">
+                          <a:solidFill>
+                            <a:srgbClr val="E6005A"/>
+                          </a:solidFill>
+                        </a:rPr>
+                        <a:t>+ </a:t>
+                      </a:r>
+                      <a:r>
+                        <a:rPr lang="pt-BR" sz="1800" dirty="0" err="1">
+                          <a:solidFill>
+                            <a:srgbClr val="E6005A"/>
+                          </a:solidFill>
+                        </a:rPr>
+                        <a:t>getHoraCadastro</a:t>
+                      </a:r>
+                      <a:r>
+                        <a:rPr lang="pt-BR" sz="1800" dirty="0">
+                          <a:solidFill>
+                            <a:srgbClr val="E6005A"/>
+                          </a:solidFill>
+                        </a:rPr>
+                        <a:t>: </a:t>
+                      </a:r>
+                      <a:r>
+                        <a:rPr lang="pt-BR" sz="1800" dirty="0" err="1">
+                          <a:solidFill>
+                            <a:srgbClr val="E6005A"/>
+                          </a:solidFill>
+                        </a:rPr>
+                        <a:t>LocalDate</a:t>
                       </a:r>
                       <a:endParaRPr lang="pt-BR" sz="1800" dirty="0">
                         <a:solidFill>
@@ -43816,14 +44002,14 @@
           <p:nvPr>
             <p:extLst>
               <p:ext uri="{D42A27DB-BD31-4B8C-83A1-F6EECF244321}">
-                <p14:modId xmlns:p14="http://schemas.microsoft.com/office/powerpoint/2010/main" val="3861262797"/>
+                <p14:modId xmlns:p14="http://schemas.microsoft.com/office/powerpoint/2010/main" val="1612542366"/>
               </p:ext>
             </p:extLst>
           </p:nvPr>
         </p:nvGraphicFramePr>
         <p:xfrm>
           <a:off x="4770167" y="1856043"/>
-          <a:ext cx="3511707" cy="2674416"/>
+          <a:ext cx="3511707" cy="3223056"/>
         </p:xfrm>
         <a:graphic>
           <a:graphicData uri="http://schemas.openxmlformats.org/drawingml/2006/table">
@@ -44028,6 +44214,68 @@
                         </a:rPr>
                         <a:t>Usuario</a:t>
                       </a:r>
+                      <a:endParaRPr lang="pt-BR" sz="1800" dirty="0">
+                        <a:solidFill>
+                          <a:srgbClr val="E6005A"/>
+                        </a:solidFill>
+                      </a:endParaRPr>
+                    </a:p>
+                    <a:p>
+                      <a:r>
+                        <a:rPr lang="pt-BR" sz="1800" dirty="0">
+                          <a:solidFill>
+                            <a:srgbClr val="E6005A"/>
+                          </a:solidFill>
+                        </a:rPr>
+                        <a:t>+</a:t>
+                      </a:r>
+                      <a:r>
+                        <a:rPr lang="pt-BR" sz="1800" dirty="0" err="1">
+                          <a:solidFill>
+                            <a:srgbClr val="E6005A"/>
+                          </a:solidFill>
+                        </a:rPr>
+                        <a:t>findByIdusuario</a:t>
+                      </a:r>
+                      <a:r>
+                        <a:rPr lang="pt-BR" sz="1800" dirty="0">
+                          <a:solidFill>
+                            <a:srgbClr val="E6005A"/>
+                          </a:solidFill>
+                        </a:rPr>
+                        <a:t>(</a:t>
+                      </a:r>
+                      <a:r>
+                        <a:rPr lang="pt-BR" sz="1800" dirty="0" err="1">
+                          <a:solidFill>
+                            <a:srgbClr val="E6005A"/>
+                          </a:solidFill>
+                        </a:rPr>
+                        <a:t>Integer</a:t>
+                      </a:r>
+                      <a:r>
+                        <a:rPr lang="pt-BR" sz="1800" dirty="0">
+                          <a:solidFill>
+                            <a:srgbClr val="E6005A"/>
+                          </a:solidFill>
+                        </a:rPr>
+                        <a:t>):</a:t>
+                      </a:r>
+                      <a:r>
+                        <a:rPr lang="pt-BR" sz="1800" dirty="0" err="1">
+                          <a:solidFill>
+                            <a:srgbClr val="E6005A"/>
+                          </a:solidFill>
+                        </a:rPr>
+                        <a:t>Usuario</a:t>
+                      </a:r>
+                      <a:endParaRPr lang="pt-BR" sz="1800" dirty="0">
+                        <a:solidFill>
+                          <a:srgbClr val="E6005A"/>
+                        </a:solidFill>
+                      </a:endParaRPr>
+                    </a:p>
+                    <a:p>
                       <a:endParaRPr lang="pt-BR" sz="1800" dirty="0">
                         <a:solidFill>
                           <a:srgbClr val="E6005A"/>
@@ -44405,7 +44653,7 @@
         <p:spPr>
           <a:xfrm>
             <a:off x="3875600" y="2781784"/>
-            <a:ext cx="894567" cy="411467"/>
+            <a:ext cx="894567" cy="685787"/>
           </a:xfrm>
           <a:prstGeom prst="straightConnector1">
             <a:avLst/>
@@ -44504,7 +44752,7 @@
         </p:nvCxnSpPr>
         <p:spPr>
           <a:xfrm>
-            <a:off x="8281874" y="3193251"/>
+            <a:off x="8281874" y="3467571"/>
             <a:ext cx="1584086" cy="824238"/>
           </a:xfrm>
           <a:prstGeom prst="straightConnector1">

</xml_diff>

<commit_message>
Atualização do Diagrama de Arquitetura
</commit_message>
<xml_diff>
--- a/Documentação/Engenharia de Sofware - Arq Componentes.pptx
+++ b/Documentação/Engenharia de Sofware - Arq Componentes.pptx
@@ -227,7 +227,7 @@
             <a:fld id="{C3CD65D1-5C11-455D-9F9A-0E035F00A0DA}" type="datetimeFigureOut">
               <a:rPr lang="pt-BR" smtClean="0"/>
               <a:pPr/>
-              <a:t>24/11/2021</a:t>
+              <a:t>25/11/2021</a:t>
             </a:fld>
             <a:endParaRPr lang="pt-BR"/>
           </a:p>
@@ -395,7 +395,7 @@
             <a:fld id="{A05DA3EF-18EA-43DE-B1BB-402A3C558822}" type="datetimeFigureOut">
               <a:rPr lang="pt-BR" smtClean="0"/>
               <a:pPr/>
-              <a:t>24/11/2021</a:t>
+              <a:t>25/11/2021</a:t>
             </a:fld>
             <a:endParaRPr lang="pt-BR"/>
           </a:p>
@@ -24741,14 +24741,14 @@
           <p:nvPr>
             <p:extLst>
               <p:ext uri="{D42A27DB-BD31-4B8C-83A1-F6EECF244321}">
-                <p14:modId xmlns:p14="http://schemas.microsoft.com/office/powerpoint/2010/main" val="3400142255"/>
+                <p14:modId xmlns:p14="http://schemas.microsoft.com/office/powerpoint/2010/main" val="4168486843"/>
               </p:ext>
             </p:extLst>
           </p:nvPr>
         </p:nvGraphicFramePr>
         <p:xfrm>
           <a:off x="164557" y="1546080"/>
-          <a:ext cx="3711043" cy="2985183"/>
+          <a:ext cx="3711043" cy="2674416"/>
         </p:xfrm>
         <a:graphic>
           <a:graphicData uri="http://schemas.openxmlformats.org/drawingml/2006/table">
@@ -24886,81 +24886,6 @@
                   <a:txBody>
                     <a:bodyPr/>
                     <a:lstStyle/>
-                    <a:p>
-                      <a:r>
-                        <a:rPr lang="pt-BR" sz="1800" dirty="0">
-                          <a:solidFill>
-                            <a:srgbClr val="FF0000"/>
-                          </a:solidFill>
-                        </a:rPr>
-                        <a:t>+</a:t>
-                      </a:r>
-                      <a:r>
-                        <a:rPr lang="pt-BR" sz="1800" kern="1200" dirty="0" err="1">
-                          <a:solidFill>
-                            <a:srgbClr val="FF0000"/>
-                          </a:solidFill>
-                          <a:effectLst/>
-                          <a:latin typeface="+mn-lt"/>
-                          <a:ea typeface="+mn-ea"/>
-                          <a:cs typeface="+mn-cs"/>
-                        </a:rPr>
-                        <a:t>getRecentCurso</a:t>
-                      </a:r>
-                      <a:r>
-                        <a:rPr lang="pt-BR" sz="1800" dirty="0">
-                          <a:solidFill>
-                            <a:srgbClr val="FF0000"/>
-                          </a:solidFill>
-                        </a:rPr>
-                        <a:t> (</a:t>
-                      </a:r>
-                      <a:r>
-                        <a:rPr lang="pt-BR" sz="1800" dirty="0" err="1">
-                          <a:solidFill>
-                            <a:srgbClr val="FF0000"/>
-                          </a:solidFill>
-                        </a:rPr>
-                        <a:t>Integer</a:t>
-                      </a:r>
-                      <a:r>
-                        <a:rPr lang="pt-BR" sz="1800" dirty="0">
-                          <a:solidFill>
-                            <a:srgbClr val="FF0000"/>
-                          </a:solidFill>
-                        </a:rPr>
-                        <a:t>, </a:t>
-                      </a:r>
-                      <a:r>
-                        <a:rPr lang="pt-BR" sz="1800" dirty="0" err="1">
-                          <a:solidFill>
-                            <a:srgbClr val="FF0000"/>
-                          </a:solidFill>
-                        </a:rPr>
-                        <a:t>LocalDate</a:t>
-                      </a:r>
-                      <a:r>
-                        <a:rPr lang="pt-BR" sz="1800" dirty="0">
-                          <a:solidFill>
-                            <a:srgbClr val="FF0000"/>
-                          </a:solidFill>
-                        </a:rPr>
-                        <a:t>): </a:t>
-                      </a:r>
-                      <a:r>
-                        <a:rPr lang="pt-BR" sz="1800" dirty="0" err="1">
-                          <a:solidFill>
-                            <a:srgbClr val="FF0000"/>
-                          </a:solidFill>
-                        </a:rPr>
-                        <a:t>ResponseEntity</a:t>
-                      </a:r>
-                      <a:endParaRPr lang="pt-BR" sz="1800" dirty="0">
-                        <a:solidFill>
-                          <a:srgbClr val="FF0000"/>
-                        </a:solidFill>
-                      </a:endParaRPr>
-                    </a:p>
                     <a:p>
                       <a:r>
                         <a:rPr lang="pt-BR" sz="1800" dirty="0">
@@ -26406,8 +26331,8 @@
         </p:nvCxnSpPr>
         <p:spPr>
           <a:xfrm>
-            <a:off x="3875600" y="3038671"/>
-            <a:ext cx="894567" cy="85792"/>
+            <a:off x="3875600" y="2883288"/>
+            <a:ext cx="894567" cy="241175"/>
           </a:xfrm>
           <a:prstGeom prst="straightConnector1">
             <a:avLst/>
@@ -27645,7 +27570,7 @@
           <p:nvPr>
             <p:extLst>
               <p:ext uri="{D42A27DB-BD31-4B8C-83A1-F6EECF244321}">
-                <p14:modId xmlns:p14="http://schemas.microsoft.com/office/powerpoint/2010/main" val="798115580"/>
+                <p14:modId xmlns:p14="http://schemas.microsoft.com/office/powerpoint/2010/main" val="3310285163"/>
               </p:ext>
             </p:extLst>
           </p:nvPr>
@@ -27790,98 +27715,6 @@
                   <a:txBody>
                     <a:bodyPr/>
                     <a:lstStyle/>
-                    <a:p>
-                      <a:r>
-                        <a:rPr lang="pt-BR" sz="1800" dirty="0">
-                          <a:solidFill>
-                            <a:srgbClr val="FF0000"/>
-                          </a:solidFill>
-                        </a:rPr>
-                        <a:t>+ </a:t>
-                      </a:r>
-                      <a:r>
-                        <a:rPr lang="pt-BR" sz="1800" kern="1200" dirty="0" err="1">
-                          <a:solidFill>
-                            <a:srgbClr val="FF0000"/>
-                          </a:solidFill>
-                          <a:effectLst/>
-                          <a:latin typeface="+mn-lt"/>
-                          <a:ea typeface="+mn-ea"/>
-                          <a:cs typeface="+mn-cs"/>
-                        </a:rPr>
-                        <a:t>findByIdCurso</a:t>
-                      </a:r>
-                      <a:r>
-                        <a:rPr lang="pt-BR" sz="1800" kern="1200" dirty="0">
-                          <a:solidFill>
-                            <a:srgbClr val="FF0000"/>
-                          </a:solidFill>
-                          <a:effectLst/>
-                          <a:latin typeface="+mn-lt"/>
-                          <a:ea typeface="+mn-ea"/>
-                          <a:cs typeface="+mn-cs"/>
-                        </a:rPr>
-                        <a:t> </a:t>
-                      </a:r>
-                      <a:r>
-                        <a:rPr lang="pt-BR" sz="1800" dirty="0">
-                          <a:solidFill>
-                            <a:srgbClr val="FF0000"/>
-                          </a:solidFill>
-                        </a:rPr>
-                        <a:t>(</a:t>
-                      </a:r>
-                      <a:r>
-                        <a:rPr lang="pt-BR" sz="1800" dirty="0" err="1">
-                          <a:solidFill>
-                            <a:srgbClr val="FF0000"/>
-                          </a:solidFill>
-                        </a:rPr>
-                        <a:t>Integer</a:t>
-                      </a:r>
-                      <a:r>
-                        <a:rPr lang="pt-BR" sz="1800" dirty="0">
-                          <a:solidFill>
-                            <a:srgbClr val="FF0000"/>
-                          </a:solidFill>
-                        </a:rPr>
-                        <a:t>):</a:t>
-                      </a:r>
-                    </a:p>
-                    <a:p>
-                      <a:r>
-                        <a:rPr lang="pt-BR" sz="1800" dirty="0" err="1">
-                          <a:solidFill>
-                            <a:srgbClr val="FF0000"/>
-                          </a:solidFill>
-                        </a:rPr>
-                        <a:t>List</a:t>
-                      </a:r>
-                      <a:r>
-                        <a:rPr lang="pt-BR" sz="1800" dirty="0">
-                          <a:solidFill>
-                            <a:srgbClr val="FF0000"/>
-                          </a:solidFill>
-                        </a:rPr>
-                        <a:t>&lt;</a:t>
-                      </a:r>
-                      <a:r>
-                        <a:rPr lang="pt-BR" sz="1800" dirty="0" err="1">
-                          <a:solidFill>
-                            <a:srgbClr val="FF0000"/>
-                          </a:solidFill>
-                        </a:rPr>
-                        <a:t>VideoCurso</a:t>
-                      </a:r>
-                      <a:r>
-                        <a:rPr lang="pt-BR" sz="1800" dirty="0">
-                          <a:solidFill>
-                            <a:srgbClr val="FF0000"/>
-                          </a:solidFill>
-                        </a:rPr>
-                        <a:t>&gt;</a:t>
-                      </a:r>
-                    </a:p>
                     <a:p>
                       <a:endParaRPr lang="pt-BR" sz="1800" dirty="0">
                         <a:solidFill>
@@ -35387,11 +35220,17 @@
           <p:cNvGraphicFramePr>
             <a:graphicFrameLocks noGrp="1"/>
           </p:cNvGraphicFramePr>
-          <p:nvPr/>
+          <p:nvPr>
+            <p:extLst>
+              <p:ext uri="{D42A27DB-BD31-4B8C-83A1-F6EECF244321}">
+                <p14:modId xmlns:p14="http://schemas.microsoft.com/office/powerpoint/2010/main" val="2375157578"/>
+              </p:ext>
+            </p:extLst>
+          </p:nvPr>
         </p:nvGraphicFramePr>
         <p:xfrm>
           <a:off x="4770167" y="933907"/>
-          <a:ext cx="3511707" cy="3750719"/>
+          <a:ext cx="3511707" cy="3484462"/>
         </p:xfrm>
         <a:graphic>
           <a:graphicData uri="http://schemas.openxmlformats.org/drawingml/2006/table">
@@ -35572,64 +35411,6 @@
                       </a:r>
                     </a:p>
                     <a:p>
-                      <a:r>
-                        <a:rPr lang="pt-BR" sz="1800" dirty="0" err="1">
-                          <a:solidFill>
-                            <a:srgbClr val="E6005A"/>
-                          </a:solidFill>
-                        </a:rPr>
-                        <a:t>List</a:t>
-                      </a:r>
-                      <a:r>
-                        <a:rPr lang="pt-BR" sz="1800" dirty="0">
-                          <a:solidFill>
-                            <a:srgbClr val="E6005A"/>
-                          </a:solidFill>
-                        </a:rPr>
-                        <a:t>&lt;Curso&gt;</a:t>
-                      </a:r>
-                    </a:p>
-                    <a:p>
-                      <a:r>
-                        <a:rPr lang="pt-BR" sz="1800" dirty="0">
-                          <a:solidFill>
-                            <a:srgbClr val="E6005A"/>
-                          </a:solidFill>
-                        </a:rPr>
-                        <a:t>+</a:t>
-                      </a:r>
-                      <a:r>
-                        <a:rPr lang="pt-BR" sz="1800" dirty="0" err="1">
-                          <a:solidFill>
-                            <a:srgbClr val="E6005A"/>
-                          </a:solidFill>
-                        </a:rPr>
-                        <a:t>findByNomeCursoLike</a:t>
-                      </a:r>
-                      <a:r>
-                        <a:rPr lang="pt-BR" sz="1800" dirty="0">
-                          <a:solidFill>
-                            <a:srgbClr val="E6005A"/>
-                          </a:solidFill>
-                        </a:rPr>
-                        <a:t>(</a:t>
-                      </a:r>
-                      <a:r>
-                        <a:rPr lang="pt-BR" sz="1800" dirty="0" err="1">
-                          <a:solidFill>
-                            <a:srgbClr val="E6005A"/>
-                          </a:solidFill>
-                        </a:rPr>
-                        <a:t>String</a:t>
-                      </a:r>
-                      <a:r>
-                        <a:rPr lang="pt-BR" sz="1800" dirty="0">
-                          <a:solidFill>
-                            <a:srgbClr val="E6005A"/>
-                          </a:solidFill>
-                        </a:rPr>
-                        <a:t>): </a:t>
-                      </a:r>
                       <a:r>
                         <a:rPr lang="pt-BR" sz="1800" dirty="0" err="1">
                           <a:solidFill>
@@ -36111,8 +35892,8 @@
         </p:nvCxnSpPr>
         <p:spPr>
           <a:xfrm flipV="1">
-            <a:off x="4040493" y="2809266"/>
-            <a:ext cx="729674" cy="346250"/>
+            <a:off x="4040493" y="2676138"/>
+            <a:ext cx="729674" cy="479378"/>
           </a:xfrm>
           <a:prstGeom prst="straightConnector1">
             <a:avLst/>
@@ -36211,8 +35992,8 @@
         </p:nvCxnSpPr>
         <p:spPr>
           <a:xfrm>
-            <a:off x="8281874" y="2809266"/>
-            <a:ext cx="1304913" cy="704634"/>
+            <a:off x="8281874" y="2676138"/>
+            <a:ext cx="1304913" cy="837762"/>
           </a:xfrm>
           <a:prstGeom prst="straightConnector1">
             <a:avLst/>
@@ -39441,7 +39222,7 @@
           <p:nvPr>
             <p:extLst>
               <p:ext uri="{D42A27DB-BD31-4B8C-83A1-F6EECF244321}">
-                <p14:modId xmlns:p14="http://schemas.microsoft.com/office/powerpoint/2010/main" val="704904025"/>
+                <p14:modId xmlns:p14="http://schemas.microsoft.com/office/powerpoint/2010/main" val="2603337365"/>
               </p:ext>
             </p:extLst>
           </p:nvPr>
@@ -39586,82 +39367,6 @@
                   <a:txBody>
                     <a:bodyPr/>
                     <a:lstStyle/>
-                    <a:p>
-                      <a:r>
-                        <a:rPr lang="pt-BR" sz="1800" dirty="0">
-                          <a:solidFill>
-                            <a:srgbClr val="E6005A"/>
-                          </a:solidFill>
-                        </a:rPr>
-                        <a:t>+ </a:t>
-                      </a:r>
-                      <a:r>
-                        <a:rPr lang="pt-BR" sz="1800" dirty="0" err="1">
-                          <a:solidFill>
-                            <a:srgbClr val="E6005A"/>
-                          </a:solidFill>
-                        </a:rPr>
-                        <a:t>findByFkEmpresa</a:t>
-                      </a:r>
-                      <a:r>
-                        <a:rPr lang="pt-BR" sz="1800" dirty="0">
-                          <a:solidFill>
-                            <a:srgbClr val="E6005A"/>
-                          </a:solidFill>
-                        </a:rPr>
-                        <a:t>(</a:t>
-                      </a:r>
-                      <a:r>
-                        <a:rPr lang="pt-BR" sz="1800" dirty="0" err="1">
-                          <a:solidFill>
-                            <a:srgbClr val="E6005A"/>
-                          </a:solidFill>
-                        </a:rPr>
-                        <a:t>Integer</a:t>
-                      </a:r>
-                      <a:r>
-                        <a:rPr lang="pt-BR" sz="1800" dirty="0">
-                          <a:solidFill>
-                            <a:srgbClr val="E6005A"/>
-                          </a:solidFill>
-                        </a:rPr>
-                        <a:t> ):</a:t>
-                      </a:r>
-                    </a:p>
-                    <a:p>
-                      <a:r>
-                        <a:rPr lang="pt-BR" sz="1800" dirty="0" err="1">
-                          <a:solidFill>
-                            <a:srgbClr val="E6005A"/>
-                          </a:solidFill>
-                        </a:rPr>
-                        <a:t>List</a:t>
-                      </a:r>
-                      <a:r>
-                        <a:rPr lang="pt-BR" sz="1800" dirty="0">
-                          <a:solidFill>
-                            <a:srgbClr val="E6005A"/>
-                          </a:solidFill>
-                        </a:rPr>
-                        <a:t>&lt;</a:t>
-                      </a:r>
-                      <a:r>
-                        <a:rPr lang="pt-BR" sz="1800" dirty="0" err="1">
-                          <a:solidFill>
-                            <a:srgbClr val="E6005A"/>
-                          </a:solidFill>
-                        </a:rPr>
-                        <a:t>EmpresaCurso</a:t>
-                      </a:r>
-                      <a:r>
-                        <a:rPr lang="pt-BR" sz="1800" dirty="0">
-                          <a:solidFill>
-                            <a:srgbClr val="E6005A"/>
-                          </a:solidFill>
-                        </a:rPr>
-                        <a:t>&gt;</a:t>
-                      </a:r>
-                    </a:p>
                     <a:p>
                       <a:endParaRPr lang="pt-BR" dirty="0"/>
                     </a:p>

</xml_diff>